<commit_message>
Update KP-Presentation - for DATA607.pptx
updated presentation
</commit_message>
<xml_diff>
--- a/Report/KP-Presentation - for DATA607.pptx
+++ b/Report/KP-Presentation - for DATA607.pptx
@@ -13,11 +13,11 @@
   <p:sldIdLst>
     <p:sldId id="256" r:id="rId5"/>
     <p:sldId id="257" r:id="rId6"/>
-    <p:sldId id="278" r:id="rId7"/>
-    <p:sldId id="287" r:id="rId8"/>
-    <p:sldId id="288" r:id="rId9"/>
-    <p:sldId id="290" r:id="rId10"/>
-    <p:sldId id="289" r:id="rId11"/>
+    <p:sldId id="291" r:id="rId7"/>
+    <p:sldId id="292" r:id="rId8"/>
+    <p:sldId id="293" r:id="rId9"/>
+    <p:sldId id="294" r:id="rId10"/>
+    <p:sldId id="295" r:id="rId11"/>
     <p:sldId id="286" r:id="rId12"/>
     <p:sldId id="271" r:id="rId13"/>
   </p:sldIdLst>
@@ -129,468 +129,12 @@
 </p:presentation>
 </file>
 
-<file path=ppt/changesInfos/changesInfo1.xml><?xml version="1.0" encoding="utf-8"?>
-<pc:chgInfo xmlns:a="http://schemas.openxmlformats.org/drawingml/2006/main" xmlns:r="http://schemas.openxmlformats.org/officeDocument/2006/relationships" xmlns:ac="http://schemas.microsoft.com/office/drawing/2013/main/command" xmlns:pc="http://schemas.microsoft.com/office/powerpoint/2013/main/command">
-  <pc:docChgLst>
-    <pc:chgData name="Koohyar Pooladvand" userId="76b51dfa0b89278a" providerId="LiveId" clId="{4E6EBF7B-E437-447B-8CEF-EC3F052F12FC}"/>
-    <pc:docChg chg="modSld">
-      <pc:chgData name="Koohyar Pooladvand" userId="76b51dfa0b89278a" providerId="LiveId" clId="{4E6EBF7B-E437-447B-8CEF-EC3F052F12FC}" dt="2024-03-16T14:17:13.096" v="3" actId="6549"/>
-      <pc:docMkLst>
-        <pc:docMk/>
-      </pc:docMkLst>
-      <pc:sldChg chg="modNotesTx">
-        <pc:chgData name="Koohyar Pooladvand" userId="76b51dfa0b89278a" providerId="LiveId" clId="{4E6EBF7B-E437-447B-8CEF-EC3F052F12FC}" dt="2024-03-16T14:16:59.900" v="0" actId="6549"/>
-        <pc:sldMkLst>
-          <pc:docMk/>
-          <pc:sldMk cId="608796113" sldId="278"/>
-        </pc:sldMkLst>
-      </pc:sldChg>
-      <pc:sldChg chg="modNotesTx">
-        <pc:chgData name="Koohyar Pooladvand" userId="76b51dfa0b89278a" providerId="LiveId" clId="{4E6EBF7B-E437-447B-8CEF-EC3F052F12FC}" dt="2024-03-16T14:17:04.193" v="1" actId="6549"/>
-        <pc:sldMkLst>
-          <pc:docMk/>
-          <pc:sldMk cId="294756942" sldId="287"/>
-        </pc:sldMkLst>
-      </pc:sldChg>
-      <pc:sldChg chg="modNotesTx">
-        <pc:chgData name="Koohyar Pooladvand" userId="76b51dfa0b89278a" providerId="LiveId" clId="{4E6EBF7B-E437-447B-8CEF-EC3F052F12FC}" dt="2024-03-16T14:17:08.899" v="2" actId="6549"/>
-        <pc:sldMkLst>
-          <pc:docMk/>
-          <pc:sldMk cId="706140070" sldId="288"/>
-        </pc:sldMkLst>
-      </pc:sldChg>
-      <pc:sldChg chg="modNotesTx">
-        <pc:chgData name="Koohyar Pooladvand" userId="76b51dfa0b89278a" providerId="LiveId" clId="{4E6EBF7B-E437-447B-8CEF-EC3F052F12FC}" dt="2024-03-16T14:17:13.096" v="3" actId="6549"/>
-        <pc:sldMkLst>
-          <pc:docMk/>
-          <pc:sldMk cId="3740506071" sldId="290"/>
-        </pc:sldMkLst>
-      </pc:sldChg>
-    </pc:docChg>
-  </pc:docChgLst>
-  <pc:docChgLst>
-    <pc:chgData name="Koohyar Pooladvand" userId="76b51dfa0b89278a" providerId="LiveId" clId="{A3267F6D-FB20-4A4B-8CBE-E7486C9B95B5}"/>
-    <pc:docChg chg="undo custSel addSld delSld modSld sldOrd">
-      <pc:chgData name="Koohyar Pooladvand" userId="76b51dfa0b89278a" providerId="LiveId" clId="{A3267F6D-FB20-4A4B-8CBE-E7486C9B95B5}" dt="2024-03-13T22:18:00.619" v="2797" actId="20577"/>
-      <pc:docMkLst>
-        <pc:docMk/>
-      </pc:docMkLst>
-      <pc:sldChg chg="modSp mod">
-        <pc:chgData name="Koohyar Pooladvand" userId="76b51dfa0b89278a" providerId="LiveId" clId="{A3267F6D-FB20-4A4B-8CBE-E7486C9B95B5}" dt="2024-03-12T00:38:13.730" v="2781" actId="20577"/>
-        <pc:sldMkLst>
-          <pc:docMk/>
-          <pc:sldMk cId="2586058810" sldId="256"/>
-        </pc:sldMkLst>
-        <pc:spChg chg="mod">
-          <ac:chgData name="Koohyar Pooladvand" userId="76b51dfa0b89278a" providerId="LiveId" clId="{A3267F6D-FB20-4A4B-8CBE-E7486C9B95B5}" dt="2024-03-12T00:38:13.730" v="2781" actId="20577"/>
-          <ac:spMkLst>
-            <pc:docMk/>
-            <pc:sldMk cId="2586058810" sldId="256"/>
-            <ac:spMk id="2" creationId="{CFE75451-6A4B-484B-9ED1-353CCE25B0F4}"/>
-          </ac:spMkLst>
-        </pc:spChg>
-      </pc:sldChg>
-      <pc:sldChg chg="addSp delSp modSp mod">
-        <pc:chgData name="Koohyar Pooladvand" userId="76b51dfa0b89278a" providerId="LiveId" clId="{A3267F6D-FB20-4A4B-8CBE-E7486C9B95B5}" dt="2024-03-12T00:39:10.927" v="2794" actId="20577"/>
-        <pc:sldMkLst>
-          <pc:docMk/>
-          <pc:sldMk cId="1713219598" sldId="257"/>
-        </pc:sldMkLst>
-        <pc:spChg chg="mod">
-          <ac:chgData name="Koohyar Pooladvand" userId="76b51dfa0b89278a" providerId="LiveId" clId="{A3267F6D-FB20-4A4B-8CBE-E7486C9B95B5}" dt="2024-03-12T00:39:10.927" v="2794" actId="20577"/>
-          <ac:spMkLst>
-            <pc:docMk/>
-            <pc:sldMk cId="1713219598" sldId="257"/>
-            <ac:spMk id="3" creationId="{5671D7E5-EF66-4BCD-8DAA-E9061157F0BE}"/>
-          </ac:spMkLst>
-        </pc:spChg>
-        <pc:spChg chg="add del mod">
-          <ac:chgData name="Koohyar Pooladvand" userId="76b51dfa0b89278a" providerId="LiveId" clId="{A3267F6D-FB20-4A4B-8CBE-E7486C9B95B5}" dt="2024-03-11T23:49:09.739" v="2007" actId="21"/>
-          <ac:spMkLst>
-            <pc:docMk/>
-            <pc:sldMk cId="1713219598" sldId="257"/>
-            <ac:spMk id="6" creationId="{A148F26A-3040-E8A6-D603-E4441E54C4C4}"/>
-          </ac:spMkLst>
-        </pc:spChg>
-      </pc:sldChg>
-      <pc:sldChg chg="del">
-        <pc:chgData name="Koohyar Pooladvand" userId="76b51dfa0b89278a" providerId="LiveId" clId="{A3267F6D-FB20-4A4B-8CBE-E7486C9B95B5}" dt="2024-03-12T00:35:10.811" v="2671" actId="47"/>
-        <pc:sldMkLst>
-          <pc:docMk/>
-          <pc:sldMk cId="3571516367" sldId="258"/>
-        </pc:sldMkLst>
-      </pc:sldChg>
-      <pc:sldChg chg="del">
-        <pc:chgData name="Koohyar Pooladvand" userId="76b51dfa0b89278a" providerId="LiveId" clId="{A3267F6D-FB20-4A4B-8CBE-E7486C9B95B5}" dt="2024-03-12T00:35:20.876" v="2674" actId="47"/>
-        <pc:sldMkLst>
-          <pc:docMk/>
-          <pc:sldMk cId="1742861620" sldId="266"/>
-        </pc:sldMkLst>
-      </pc:sldChg>
-      <pc:sldChg chg="modSp mod">
-        <pc:chgData name="Koohyar Pooladvand" userId="76b51dfa0b89278a" providerId="LiveId" clId="{A3267F6D-FB20-4A4B-8CBE-E7486C9B95B5}" dt="2024-03-13T22:18:00.619" v="2797" actId="20577"/>
-        <pc:sldMkLst>
-          <pc:docMk/>
-          <pc:sldMk cId="1969787568" sldId="271"/>
-        </pc:sldMkLst>
-        <pc:spChg chg="mod">
-          <ac:chgData name="Koohyar Pooladvand" userId="76b51dfa0b89278a" providerId="LiveId" clId="{A3267F6D-FB20-4A4B-8CBE-E7486C9B95B5}" dt="2024-03-13T22:18:00.619" v="2797" actId="20577"/>
-          <ac:spMkLst>
-            <pc:docMk/>
-            <pc:sldMk cId="1969787568" sldId="271"/>
-            <ac:spMk id="3" creationId="{AF64C29E-DF30-4DC6-AB95-2016F9A703B6}"/>
-          </ac:spMkLst>
-        </pc:spChg>
-      </pc:sldChg>
-      <pc:sldChg chg="addSp modSp mod modClrScheme chgLayout modNotesTx">
-        <pc:chgData name="Koohyar Pooladvand" userId="76b51dfa0b89278a" providerId="LiveId" clId="{A3267F6D-FB20-4A4B-8CBE-E7486C9B95B5}" dt="2024-03-12T00:53:13.374" v="2795" actId="2"/>
-        <pc:sldMkLst>
-          <pc:docMk/>
-          <pc:sldMk cId="608796113" sldId="278"/>
-        </pc:sldMkLst>
-        <pc:spChg chg="mod ord">
-          <ac:chgData name="Koohyar Pooladvand" userId="76b51dfa0b89278a" providerId="LiveId" clId="{A3267F6D-FB20-4A4B-8CBE-E7486C9B95B5}" dt="2024-03-11T12:06:13.666" v="75" actId="700"/>
-          <ac:spMkLst>
-            <pc:docMk/>
-            <pc:sldMk cId="608796113" sldId="278"/>
-            <ac:spMk id="2" creationId="{9528DBD1-DB29-D44F-FD5A-3071BB37EF37}"/>
-          </ac:spMkLst>
-        </pc:spChg>
-        <pc:spChg chg="add mod ord">
-          <ac:chgData name="Koohyar Pooladvand" userId="76b51dfa0b89278a" providerId="LiveId" clId="{A3267F6D-FB20-4A4B-8CBE-E7486C9B95B5}" dt="2024-03-11T23:42:40.210" v="1904" actId="20577"/>
-          <ac:spMkLst>
-            <pc:docMk/>
-            <pc:sldMk cId="608796113" sldId="278"/>
-            <ac:spMk id="3" creationId="{726B12F0-0992-FDEA-E538-7182599D43D0}"/>
-          </ac:spMkLst>
-        </pc:spChg>
-        <pc:spChg chg="add mod ord">
-          <ac:chgData name="Koohyar Pooladvand" userId="76b51dfa0b89278a" providerId="LiveId" clId="{A3267F6D-FB20-4A4B-8CBE-E7486C9B95B5}" dt="2024-03-11T23:43:20.759" v="1929" actId="20577"/>
-          <ac:spMkLst>
-            <pc:docMk/>
-            <pc:sldMk cId="608796113" sldId="278"/>
-            <ac:spMk id="4" creationId="{AE6B76D1-DA93-E5FE-A0A2-AB3DBDF7A938}"/>
-          </ac:spMkLst>
-        </pc:spChg>
-        <pc:spChg chg="add mod ord">
-          <ac:chgData name="Koohyar Pooladvand" userId="76b51dfa0b89278a" providerId="LiveId" clId="{A3267F6D-FB20-4A4B-8CBE-E7486C9B95B5}" dt="2024-03-12T00:53:13.374" v="2795" actId="2"/>
-          <ac:spMkLst>
-            <pc:docMk/>
-            <pc:sldMk cId="608796113" sldId="278"/>
-            <ac:spMk id="5" creationId="{97545A84-99EE-17C7-C9BE-648829A8DB4C}"/>
-          </ac:spMkLst>
-        </pc:spChg>
-        <pc:spChg chg="add mod ord">
-          <ac:chgData name="Koohyar Pooladvand" userId="76b51dfa0b89278a" providerId="LiveId" clId="{A3267F6D-FB20-4A4B-8CBE-E7486C9B95B5}" dt="2024-03-11T23:43:56.449" v="1946" actId="20577"/>
-          <ac:spMkLst>
-            <pc:docMk/>
-            <pc:sldMk cId="608796113" sldId="278"/>
-            <ac:spMk id="6" creationId="{D5B82FB3-62C6-547E-9BF2-23B7B586F204}"/>
-          </ac:spMkLst>
-        </pc:spChg>
-      </pc:sldChg>
-      <pc:sldChg chg="del">
-        <pc:chgData name="Koohyar Pooladvand" userId="76b51dfa0b89278a" providerId="LiveId" clId="{A3267F6D-FB20-4A4B-8CBE-E7486C9B95B5}" dt="2024-03-11T23:10:30.683" v="1118" actId="47"/>
-        <pc:sldMkLst>
-          <pc:docMk/>
-          <pc:sldMk cId="2241459136" sldId="279"/>
-        </pc:sldMkLst>
-      </pc:sldChg>
-      <pc:sldChg chg="del">
-        <pc:chgData name="Koohyar Pooladvand" userId="76b51dfa0b89278a" providerId="LiveId" clId="{A3267F6D-FB20-4A4B-8CBE-E7486C9B95B5}" dt="2024-03-12T00:37:14.146" v="2755" actId="47"/>
-        <pc:sldMkLst>
-          <pc:docMk/>
-          <pc:sldMk cId="334696707" sldId="280"/>
-        </pc:sldMkLst>
-      </pc:sldChg>
-      <pc:sldChg chg="del">
-        <pc:chgData name="Koohyar Pooladvand" userId="76b51dfa0b89278a" providerId="LiveId" clId="{A3267F6D-FB20-4A4B-8CBE-E7486C9B95B5}" dt="2024-03-12T00:35:16.385" v="2672" actId="47"/>
-        <pc:sldMkLst>
-          <pc:docMk/>
-          <pc:sldMk cId="103458723" sldId="281"/>
-        </pc:sldMkLst>
-      </pc:sldChg>
-      <pc:sldChg chg="del">
-        <pc:chgData name="Koohyar Pooladvand" userId="76b51dfa0b89278a" providerId="LiveId" clId="{A3267F6D-FB20-4A4B-8CBE-E7486C9B95B5}" dt="2024-03-12T00:35:19.643" v="2673" actId="47"/>
-        <pc:sldMkLst>
-          <pc:docMk/>
-          <pc:sldMk cId="636929804" sldId="282"/>
-        </pc:sldMkLst>
-      </pc:sldChg>
-      <pc:sldChg chg="del">
-        <pc:chgData name="Koohyar Pooladvand" userId="76b51dfa0b89278a" providerId="LiveId" clId="{A3267F6D-FB20-4A4B-8CBE-E7486C9B95B5}" dt="2024-03-12T00:35:21.916" v="2675" actId="47"/>
-        <pc:sldMkLst>
-          <pc:docMk/>
-          <pc:sldMk cId="1658164610" sldId="283"/>
-        </pc:sldMkLst>
-      </pc:sldChg>
-      <pc:sldChg chg="del ord">
-        <pc:chgData name="Koohyar Pooladvand" userId="76b51dfa0b89278a" providerId="LiveId" clId="{A3267F6D-FB20-4A4B-8CBE-E7486C9B95B5}" dt="2024-03-12T00:35:28.101" v="2676" actId="47"/>
-        <pc:sldMkLst>
-          <pc:docMk/>
-          <pc:sldMk cId="2403577982" sldId="284"/>
-        </pc:sldMkLst>
-      </pc:sldChg>
-      <pc:sldChg chg="del ord">
-        <pc:chgData name="Koohyar Pooladvand" userId="76b51dfa0b89278a" providerId="LiveId" clId="{A3267F6D-FB20-4A4B-8CBE-E7486C9B95B5}" dt="2024-03-12T00:35:31.336" v="2677" actId="47"/>
-        <pc:sldMkLst>
-          <pc:docMk/>
-          <pc:sldMk cId="2791821786" sldId="285"/>
-        </pc:sldMkLst>
-      </pc:sldChg>
-      <pc:sldChg chg="addSp delSp modSp new mod chgLayout">
-        <pc:chgData name="Koohyar Pooladvand" userId="76b51dfa0b89278a" providerId="LiveId" clId="{A3267F6D-FB20-4A4B-8CBE-E7486C9B95B5}" dt="2024-03-11T12:05:17.071" v="64"/>
-        <pc:sldMkLst>
-          <pc:docMk/>
-          <pc:sldMk cId="1474011028" sldId="286"/>
-        </pc:sldMkLst>
-        <pc:spChg chg="del mod ord">
-          <ac:chgData name="Koohyar Pooladvand" userId="76b51dfa0b89278a" providerId="LiveId" clId="{A3267F6D-FB20-4A4B-8CBE-E7486C9B95B5}" dt="2024-03-11T12:05:00.334" v="53" actId="700"/>
-          <ac:spMkLst>
-            <pc:docMk/>
-            <pc:sldMk cId="1474011028" sldId="286"/>
-            <ac:spMk id="2" creationId="{543E36F5-9D0E-BA55-EA9E-DA6C494E3E20}"/>
-          </ac:spMkLst>
-        </pc:spChg>
-        <pc:spChg chg="del">
-          <ac:chgData name="Koohyar Pooladvand" userId="76b51dfa0b89278a" providerId="LiveId" clId="{A3267F6D-FB20-4A4B-8CBE-E7486C9B95B5}" dt="2024-03-11T12:05:00.334" v="53" actId="700"/>
-          <ac:spMkLst>
-            <pc:docMk/>
-            <pc:sldMk cId="1474011028" sldId="286"/>
-            <ac:spMk id="3" creationId="{B5BEE643-65AB-A348-BBF9-AC4128FB6D54}"/>
-          </ac:spMkLst>
-        </pc:spChg>
-        <pc:spChg chg="del mod ord">
-          <ac:chgData name="Koohyar Pooladvand" userId="76b51dfa0b89278a" providerId="LiveId" clId="{A3267F6D-FB20-4A4B-8CBE-E7486C9B95B5}" dt="2024-03-11T12:05:00.334" v="53" actId="700"/>
-          <ac:spMkLst>
-            <pc:docMk/>
-            <pc:sldMk cId="1474011028" sldId="286"/>
-            <ac:spMk id="4" creationId="{F19CEDAA-F852-3DBA-1660-6AABEFAB701D}"/>
-          </ac:spMkLst>
-        </pc:spChg>
-        <pc:spChg chg="del">
-          <ac:chgData name="Koohyar Pooladvand" userId="76b51dfa0b89278a" providerId="LiveId" clId="{A3267F6D-FB20-4A4B-8CBE-E7486C9B95B5}" dt="2024-03-11T12:05:00.334" v="53" actId="700"/>
-          <ac:spMkLst>
-            <pc:docMk/>
-            <pc:sldMk cId="1474011028" sldId="286"/>
-            <ac:spMk id="5" creationId="{880E8DEC-80A7-F6D9-04C5-E2B9E7CC57D5}"/>
-          </ac:spMkLst>
-        </pc:spChg>
-        <pc:spChg chg="del">
-          <ac:chgData name="Koohyar Pooladvand" userId="76b51dfa0b89278a" providerId="LiveId" clId="{A3267F6D-FB20-4A4B-8CBE-E7486C9B95B5}" dt="2024-03-11T12:05:00.334" v="53" actId="700"/>
-          <ac:spMkLst>
-            <pc:docMk/>
-            <pc:sldMk cId="1474011028" sldId="286"/>
-            <ac:spMk id="6" creationId="{D2BA5989-DBBD-40EC-83BB-C6C123435CC0}"/>
-          </ac:spMkLst>
-        </pc:spChg>
-        <pc:spChg chg="mod ord">
-          <ac:chgData name="Koohyar Pooladvand" userId="76b51dfa0b89278a" providerId="LiveId" clId="{A3267F6D-FB20-4A4B-8CBE-E7486C9B95B5}" dt="2024-03-11T12:05:00.334" v="53" actId="700"/>
-          <ac:spMkLst>
-            <pc:docMk/>
-            <pc:sldMk cId="1474011028" sldId="286"/>
-            <ac:spMk id="7" creationId="{A5345595-7711-37F9-2A10-685B9B50289F}"/>
-          </ac:spMkLst>
-        </pc:spChg>
-        <pc:spChg chg="add mod ord">
-          <ac:chgData name="Koohyar Pooladvand" userId="76b51dfa0b89278a" providerId="LiveId" clId="{A3267F6D-FB20-4A4B-8CBE-E7486C9B95B5}" dt="2024-03-11T12:05:13.889" v="63" actId="20577"/>
-          <ac:spMkLst>
-            <pc:docMk/>
-            <pc:sldMk cId="1474011028" sldId="286"/>
-            <ac:spMk id="8" creationId="{46A491F8-EC13-9FBC-3850-050BC00DD9AB}"/>
-          </ac:spMkLst>
-        </pc:spChg>
-        <pc:spChg chg="add mod ord">
-          <ac:chgData name="Koohyar Pooladvand" userId="76b51dfa0b89278a" providerId="LiveId" clId="{A3267F6D-FB20-4A4B-8CBE-E7486C9B95B5}" dt="2024-03-11T12:05:17.071" v="64"/>
-          <ac:spMkLst>
-            <pc:docMk/>
-            <pc:sldMk cId="1474011028" sldId="286"/>
-            <ac:spMk id="9" creationId="{762074A8-3475-7DA6-6300-8D60D6CF1EA2}"/>
-          </ac:spMkLst>
-        </pc:spChg>
-      </pc:sldChg>
-      <pc:sldChg chg="modSp add mod modNotesTx">
-        <pc:chgData name="Koohyar Pooladvand" userId="76b51dfa0b89278a" providerId="LiveId" clId="{A3267F6D-FB20-4A4B-8CBE-E7486C9B95B5}" dt="2024-03-11T23:44:30.376" v="1947" actId="113"/>
-        <pc:sldMkLst>
-          <pc:docMk/>
-          <pc:sldMk cId="294756942" sldId="287"/>
-        </pc:sldMkLst>
-        <pc:spChg chg="mod">
-          <ac:chgData name="Koohyar Pooladvand" userId="76b51dfa0b89278a" providerId="LiveId" clId="{A3267F6D-FB20-4A4B-8CBE-E7486C9B95B5}" dt="2024-03-11T12:20:37.231" v="492" actId="20577"/>
-          <ac:spMkLst>
-            <pc:docMk/>
-            <pc:sldMk cId="294756942" sldId="287"/>
-            <ac:spMk id="2" creationId="{9528DBD1-DB29-D44F-FD5A-3071BB37EF37}"/>
-          </ac:spMkLst>
-        </pc:spChg>
-        <pc:spChg chg="mod">
-          <ac:chgData name="Koohyar Pooladvand" userId="76b51dfa0b89278a" providerId="LiveId" clId="{A3267F6D-FB20-4A4B-8CBE-E7486C9B95B5}" dt="2024-03-11T23:43:03.109" v="1918" actId="20577"/>
-          <ac:spMkLst>
-            <pc:docMk/>
-            <pc:sldMk cId="294756942" sldId="287"/>
-            <ac:spMk id="3" creationId="{726B12F0-0992-FDEA-E538-7182599D43D0}"/>
-          </ac:spMkLst>
-        </pc:spChg>
-        <pc:spChg chg="mod">
-          <ac:chgData name="Koohyar Pooladvand" userId="76b51dfa0b89278a" providerId="LiveId" clId="{A3267F6D-FB20-4A4B-8CBE-E7486C9B95B5}" dt="2024-03-11T23:43:09.166" v="1924" actId="20577"/>
-          <ac:spMkLst>
-            <pc:docMk/>
-            <pc:sldMk cId="294756942" sldId="287"/>
-            <ac:spMk id="4" creationId="{AE6B76D1-DA93-E5FE-A0A2-AB3DBDF7A938}"/>
-          </ac:spMkLst>
-        </pc:spChg>
-        <pc:spChg chg="mod">
-          <ac:chgData name="Koohyar Pooladvand" userId="76b51dfa0b89278a" providerId="LiveId" clId="{A3267F6D-FB20-4A4B-8CBE-E7486C9B95B5}" dt="2024-03-11T12:34:01.796" v="1094" actId="20577"/>
-          <ac:spMkLst>
-            <pc:docMk/>
-            <pc:sldMk cId="294756942" sldId="287"/>
-            <ac:spMk id="5" creationId="{97545A84-99EE-17C7-C9BE-648829A8DB4C}"/>
-          </ac:spMkLst>
-        </pc:spChg>
-        <pc:spChg chg="mod">
-          <ac:chgData name="Koohyar Pooladvand" userId="76b51dfa0b89278a" providerId="LiveId" clId="{A3267F6D-FB20-4A4B-8CBE-E7486C9B95B5}" dt="2024-03-11T23:44:30.376" v="1947" actId="113"/>
-          <ac:spMkLst>
-            <pc:docMk/>
-            <pc:sldMk cId="294756942" sldId="287"/>
-            <ac:spMk id="6" creationId="{D5B82FB3-62C6-547E-9BF2-23B7B586F204}"/>
-          </ac:spMkLst>
-        </pc:spChg>
-      </pc:sldChg>
-      <pc:sldChg chg="modSp mod modNotesTx">
-        <pc:chgData name="Koohyar Pooladvand" userId="76b51dfa0b89278a" providerId="LiveId" clId="{A3267F6D-FB20-4A4B-8CBE-E7486C9B95B5}" dt="2024-03-12T00:03:17.106" v="2014" actId="20577"/>
-        <pc:sldMkLst>
-          <pc:docMk/>
-          <pc:sldMk cId="706140070" sldId="288"/>
-        </pc:sldMkLst>
-        <pc:spChg chg="mod">
-          <ac:chgData name="Koohyar Pooladvand" userId="76b51dfa0b89278a" providerId="LiveId" clId="{A3267F6D-FB20-4A4B-8CBE-E7486C9B95B5}" dt="2024-03-12T00:03:17.106" v="2014" actId="20577"/>
-          <ac:spMkLst>
-            <pc:docMk/>
-            <pc:sldMk cId="706140070" sldId="288"/>
-            <ac:spMk id="2" creationId="{9528DBD1-DB29-D44F-FD5A-3071BB37EF37}"/>
-          </ac:spMkLst>
-        </pc:spChg>
-        <pc:spChg chg="mod">
-          <ac:chgData name="Koohyar Pooladvand" userId="76b51dfa0b89278a" providerId="LiveId" clId="{A3267F6D-FB20-4A4B-8CBE-E7486C9B95B5}" dt="2024-03-11T23:44:46.219" v="1953" actId="20577"/>
-          <ac:spMkLst>
-            <pc:docMk/>
-            <pc:sldMk cId="706140070" sldId="288"/>
-            <ac:spMk id="3" creationId="{726B12F0-0992-FDEA-E538-7182599D43D0}"/>
-          </ac:spMkLst>
-        </pc:spChg>
-        <pc:spChg chg="mod">
-          <ac:chgData name="Koohyar Pooladvand" userId="76b51dfa0b89278a" providerId="LiveId" clId="{A3267F6D-FB20-4A4B-8CBE-E7486C9B95B5}" dt="2024-03-11T23:41:43.263" v="1900" actId="20577"/>
-          <ac:spMkLst>
-            <pc:docMk/>
-            <pc:sldMk cId="706140070" sldId="288"/>
-            <ac:spMk id="4" creationId="{AE6B76D1-DA93-E5FE-A0A2-AB3DBDF7A938}"/>
-          </ac:spMkLst>
-        </pc:spChg>
-        <pc:spChg chg="mod">
-          <ac:chgData name="Koohyar Pooladvand" userId="76b51dfa0b89278a" providerId="LiveId" clId="{A3267F6D-FB20-4A4B-8CBE-E7486C9B95B5}" dt="2024-03-11T23:41:06.327" v="1895" actId="20577"/>
-          <ac:spMkLst>
-            <pc:docMk/>
-            <pc:sldMk cId="706140070" sldId="288"/>
-            <ac:spMk id="5" creationId="{97545A84-99EE-17C7-C9BE-648829A8DB4C}"/>
-          </ac:spMkLst>
-        </pc:spChg>
-        <pc:spChg chg="mod">
-          <ac:chgData name="Koohyar Pooladvand" userId="76b51dfa0b89278a" providerId="LiveId" clId="{A3267F6D-FB20-4A4B-8CBE-E7486C9B95B5}" dt="2024-03-11T23:44:55.337" v="1958" actId="20577"/>
-          <ac:spMkLst>
-            <pc:docMk/>
-            <pc:sldMk cId="706140070" sldId="288"/>
-            <ac:spMk id="6" creationId="{D5B82FB3-62C6-547E-9BF2-23B7B586F204}"/>
-          </ac:spMkLst>
-        </pc:spChg>
-      </pc:sldChg>
-      <pc:sldChg chg="add del">
-        <pc:chgData name="Koohyar Pooladvand" userId="76b51dfa0b89278a" providerId="LiveId" clId="{A3267F6D-FB20-4A4B-8CBE-E7486C9B95B5}" dt="2024-03-11T23:16:10.259" v="1120"/>
-        <pc:sldMkLst>
-          <pc:docMk/>
-          <pc:sldMk cId="1452843293" sldId="289"/>
-        </pc:sldMkLst>
-      </pc:sldChg>
-      <pc:sldChg chg="addSp delSp modSp new mod">
-        <pc:chgData name="Koohyar Pooladvand" userId="76b51dfa0b89278a" providerId="LiveId" clId="{A3267F6D-FB20-4A4B-8CBE-E7486C9B95B5}" dt="2024-03-11T23:49:30.317" v="2013" actId="403"/>
-        <pc:sldMkLst>
-          <pc:docMk/>
-          <pc:sldMk cId="3505422092" sldId="289"/>
-        </pc:sldMkLst>
-        <pc:spChg chg="del">
-          <ac:chgData name="Koohyar Pooladvand" userId="76b51dfa0b89278a" providerId="LiveId" clId="{A3267F6D-FB20-4A4B-8CBE-E7486C9B95B5}" dt="2024-03-11T23:49:16.916" v="2009"/>
-          <ac:spMkLst>
-            <pc:docMk/>
-            <pc:sldMk cId="3505422092" sldId="289"/>
-            <ac:spMk id="2" creationId="{DC17E81F-6121-15A4-2D7A-29889B1557CF}"/>
-          </ac:spMkLst>
-        </pc:spChg>
-        <pc:spChg chg="add mod">
-          <ac:chgData name="Koohyar Pooladvand" userId="76b51dfa0b89278a" providerId="LiveId" clId="{A3267F6D-FB20-4A4B-8CBE-E7486C9B95B5}" dt="2024-03-11T23:49:30.317" v="2013" actId="403"/>
-          <ac:spMkLst>
-            <pc:docMk/>
-            <pc:sldMk cId="3505422092" sldId="289"/>
-            <ac:spMk id="8" creationId="{A148F26A-3040-E8A6-D603-E4441E54C4C4}"/>
-          </ac:spMkLst>
-        </pc:spChg>
-      </pc:sldChg>
-      <pc:sldChg chg="addSp delSp modSp new mod modNotesTx">
-        <pc:chgData name="Koohyar Pooladvand" userId="76b51dfa0b89278a" providerId="LiveId" clId="{A3267F6D-FB20-4A4B-8CBE-E7486C9B95B5}" dt="2024-03-12T00:34:56.048" v="2670" actId="20577"/>
-        <pc:sldMkLst>
-          <pc:docMk/>
-          <pc:sldMk cId="3740506071" sldId="290"/>
-        </pc:sldMkLst>
-        <pc:spChg chg="mod">
-          <ac:chgData name="Koohyar Pooladvand" userId="76b51dfa0b89278a" providerId="LiveId" clId="{A3267F6D-FB20-4A4B-8CBE-E7486C9B95B5}" dt="2024-03-12T00:34:56.048" v="2670" actId="20577"/>
-          <ac:spMkLst>
-            <pc:docMk/>
-            <pc:sldMk cId="3740506071" sldId="290"/>
-            <ac:spMk id="2" creationId="{F230FDC2-5A50-7007-8941-889203149CCB}"/>
-          </ac:spMkLst>
-        </pc:spChg>
-        <pc:spChg chg="mod">
-          <ac:chgData name="Koohyar Pooladvand" userId="76b51dfa0b89278a" providerId="LiveId" clId="{A3267F6D-FB20-4A4B-8CBE-E7486C9B95B5}" dt="2024-03-12T00:13:29.891" v="2025" actId="20577"/>
-          <ac:spMkLst>
-            <pc:docMk/>
-            <pc:sldMk cId="3740506071" sldId="290"/>
-            <ac:spMk id="3" creationId="{A2932B37-9B1E-0D72-5960-D17CFCF0143E}"/>
-          </ac:spMkLst>
-        </pc:spChg>
-        <pc:spChg chg="mod">
-          <ac:chgData name="Koohyar Pooladvand" userId="76b51dfa0b89278a" providerId="LiveId" clId="{A3267F6D-FB20-4A4B-8CBE-E7486C9B95B5}" dt="2024-03-12T00:16:28.189" v="2068" actId="27636"/>
-          <ac:spMkLst>
-            <pc:docMk/>
-            <pc:sldMk cId="3740506071" sldId="290"/>
-            <ac:spMk id="4" creationId="{65B1AAF9-A85A-94AD-0F42-3E296252615E}"/>
-          </ac:spMkLst>
-        </pc:spChg>
-        <pc:spChg chg="mod">
-          <ac:chgData name="Koohyar Pooladvand" userId="76b51dfa0b89278a" providerId="LiveId" clId="{A3267F6D-FB20-4A4B-8CBE-E7486C9B95B5}" dt="2024-03-12T00:13:38.016" v="2036" actId="20577"/>
-          <ac:spMkLst>
-            <pc:docMk/>
-            <pc:sldMk cId="3740506071" sldId="290"/>
-            <ac:spMk id="5" creationId="{1C634A68-0D75-8622-F2C1-9508F1404A34}"/>
-          </ac:spMkLst>
-        </pc:spChg>
-        <pc:spChg chg="del">
-          <ac:chgData name="Koohyar Pooladvand" userId="76b51dfa0b89278a" providerId="LiveId" clId="{A3267F6D-FB20-4A4B-8CBE-E7486C9B95B5}" dt="2024-03-12T00:18:03.741" v="2070" actId="478"/>
-          <ac:spMkLst>
-            <pc:docMk/>
-            <pc:sldMk cId="3740506071" sldId="290"/>
-            <ac:spMk id="6" creationId="{2ADF98C0-59B2-B156-D6A3-96AF237C7D6A}"/>
-          </ac:spMkLst>
-        </pc:spChg>
-        <pc:spChg chg="add mod">
-          <ac:chgData name="Koohyar Pooladvand" userId="76b51dfa0b89278a" providerId="LiveId" clId="{A3267F6D-FB20-4A4B-8CBE-E7486C9B95B5}" dt="2024-03-12T00:33:30.760" v="2632" actId="20577"/>
-          <ac:spMkLst>
-            <pc:docMk/>
-            <pc:sldMk cId="3740506071" sldId="290"/>
-            <ac:spMk id="8" creationId="{0434B976-3483-F4C6-50FE-ACBE2E236F01}"/>
-          </ac:spMkLst>
-        </pc:spChg>
-      </pc:sldChg>
-    </pc:docChg>
-  </pc:docChgLst>
-</pc:chgInfo>
+<file path=ppt/revisionInfo.xml><?xml version="1.0" encoding="utf-8"?>
+<p1510:revInfo xmlns:a="http://schemas.openxmlformats.org/drawingml/2006/main" xmlns:r="http://schemas.openxmlformats.org/officeDocument/2006/relationships" xmlns:p1510="http://schemas.microsoft.com/office/powerpoint/2015/10/main">
+  <p1510:revLst>
+    <p1510:client id="{26F47DF6-78E8-4C11-87C2-3503191FDFDD}" v="12" dt="2024-03-18T12:20:44.376"/>
+  </p1510:revLst>
+</p1510:revInfo>
 </file>
 
 <file path=ppt/handoutMasters/handoutMaster1.xml><?xml version="1.0" encoding="utf-8"?>
@@ -687,7 +231,7 @@
           <a:p>
             <a:fld id="{B56F32FC-4BD9-442A-A8C6-51598C909FE3}" type="datetimeFigureOut">
               <a:rPr lang="en-US" smtClean="0"/>
-              <a:t>3/16/2024</a:t>
+              <a:t>3/18/2024</a:t>
             </a:fld>
             <a:endParaRPr lang="en-US" dirty="0"/>
           </a:p>
@@ -864,7 +408,7 @@
           <a:p>
             <a:fld id="{056371FA-A98D-41E8-93F4-09945841298A}" type="datetimeFigureOut">
               <a:rPr lang="en-US" smtClean="0"/>
-              <a:t>3/16/2024</a:t>
+              <a:t>3/18/2024</a:t>
             </a:fld>
             <a:endParaRPr lang="en-US" dirty="0"/>
           </a:p>
@@ -1300,422 +844,6 @@
 </file>
 
 <file path=ppt/notesSlides/notesSlide3.xml><?xml version="1.0" encoding="utf-8"?>
-<p:notes xmlns:a="http://schemas.openxmlformats.org/drawingml/2006/main" xmlns:r="http://schemas.openxmlformats.org/officeDocument/2006/relationships" xmlns:p="http://schemas.openxmlformats.org/presentationml/2006/main">
-  <p:cSld>
-    <p:spTree>
-      <p:nvGrpSpPr>
-        <p:cNvPr id="1" name=""/>
-        <p:cNvGrpSpPr/>
-        <p:nvPr/>
-      </p:nvGrpSpPr>
-      <p:grpSpPr>
-        <a:xfrm>
-          <a:off x="0" y="0"/>
-          <a:ext cx="0" cy="0"/>
-          <a:chOff x="0" y="0"/>
-          <a:chExt cx="0" cy="0"/>
-        </a:xfrm>
-      </p:grpSpPr>
-      <p:sp>
-        <p:nvSpPr>
-          <p:cNvPr id="2" name="Slide Image Placeholder 1"/>
-          <p:cNvSpPr>
-            <a:spLocks noGrp="1" noRot="1" noChangeAspect="1"/>
-          </p:cNvSpPr>
-          <p:nvPr>
-            <p:ph type="sldImg"/>
-          </p:nvPr>
-        </p:nvSpPr>
-        <p:spPr/>
-      </p:sp>
-      <p:sp>
-        <p:nvSpPr>
-          <p:cNvPr id="3" name="Notes Placeholder 2"/>
-          <p:cNvSpPr>
-            <a:spLocks noGrp="1"/>
-          </p:cNvSpPr>
-          <p:nvPr>
-            <p:ph type="body" idx="1"/>
-          </p:nvPr>
-        </p:nvSpPr>
-        <p:spPr/>
-        <p:txBody>
-          <a:bodyPr/>
-          <a:lstStyle/>
-          <a:p>
-            <a:endParaRPr lang="en-US" dirty="0"/>
-          </a:p>
-        </p:txBody>
-      </p:sp>
-      <p:sp>
-        <p:nvSpPr>
-          <p:cNvPr id="4" name="Slide Number Placeholder 3"/>
-          <p:cNvSpPr>
-            <a:spLocks noGrp="1"/>
-          </p:cNvSpPr>
-          <p:nvPr>
-            <p:ph type="sldNum" sz="quarter" idx="5"/>
-          </p:nvPr>
-        </p:nvSpPr>
-        <p:spPr/>
-        <p:txBody>
-          <a:bodyPr/>
-          <a:lstStyle/>
-          <a:p>
-            <a:fld id="{22289C57-55D7-40A4-A101-E74FAC7A092B}" type="slidenum">
-              <a:rPr lang="en-US" smtClean="0"/>
-              <a:t>3</a:t>
-            </a:fld>
-            <a:endParaRPr lang="en-US" dirty="0"/>
-          </a:p>
-        </p:txBody>
-      </p:sp>
-    </p:spTree>
-    <p:extLst>
-      <p:ext uri="{BB962C8B-B14F-4D97-AF65-F5344CB8AC3E}">
-        <p14:creationId xmlns:p14="http://schemas.microsoft.com/office/powerpoint/2010/main" val="2182522689"/>
-      </p:ext>
-    </p:extLst>
-  </p:cSld>
-  <p:clrMapOvr>
-    <a:masterClrMapping/>
-  </p:clrMapOvr>
-</p:notes>
-</file>
-
-<file path=ppt/notesSlides/notesSlide4.xml><?xml version="1.0" encoding="utf-8"?>
-<p:notes xmlns:a="http://schemas.openxmlformats.org/drawingml/2006/main" xmlns:r="http://schemas.openxmlformats.org/officeDocument/2006/relationships" xmlns:p="http://schemas.openxmlformats.org/presentationml/2006/main">
-  <p:cSld>
-    <p:spTree>
-      <p:nvGrpSpPr>
-        <p:cNvPr id="1" name=""/>
-        <p:cNvGrpSpPr/>
-        <p:nvPr/>
-      </p:nvGrpSpPr>
-      <p:grpSpPr>
-        <a:xfrm>
-          <a:off x="0" y="0"/>
-          <a:ext cx="0" cy="0"/>
-          <a:chOff x="0" y="0"/>
-          <a:chExt cx="0" cy="0"/>
-        </a:xfrm>
-      </p:grpSpPr>
-      <p:sp>
-        <p:nvSpPr>
-          <p:cNvPr id="2" name="Slide Image Placeholder 1"/>
-          <p:cNvSpPr>
-            <a:spLocks noGrp="1" noRot="1" noChangeAspect="1"/>
-          </p:cNvSpPr>
-          <p:nvPr>
-            <p:ph type="sldImg"/>
-          </p:nvPr>
-        </p:nvSpPr>
-        <p:spPr/>
-      </p:sp>
-      <p:sp>
-        <p:nvSpPr>
-          <p:cNvPr id="3" name="Notes Placeholder 2"/>
-          <p:cNvSpPr>
-            <a:spLocks noGrp="1"/>
-          </p:cNvSpPr>
-          <p:nvPr>
-            <p:ph type="body" idx="1"/>
-          </p:nvPr>
-        </p:nvSpPr>
-        <p:spPr/>
-        <p:txBody>
-          <a:bodyPr/>
-          <a:lstStyle/>
-          <a:p>
-            <a:pPr algn="l">
-              <a:buFont typeface="+mj-lt"/>
-              <a:buAutoNum type="arabicPeriod"/>
-            </a:pPr>
-            <a:endParaRPr lang="en-US" b="0" i="0" dirty="0">
-              <a:solidFill>
-                <a:srgbClr val="FFFFFF"/>
-              </a:solidFill>
-              <a:effectLst/>
-              <a:latin typeface="SegoeUIVariable"/>
-            </a:endParaRPr>
-          </a:p>
-        </p:txBody>
-      </p:sp>
-      <p:sp>
-        <p:nvSpPr>
-          <p:cNvPr id="4" name="Slide Number Placeholder 3"/>
-          <p:cNvSpPr>
-            <a:spLocks noGrp="1"/>
-          </p:cNvSpPr>
-          <p:nvPr>
-            <p:ph type="sldNum" sz="quarter" idx="5"/>
-          </p:nvPr>
-        </p:nvSpPr>
-        <p:spPr/>
-        <p:txBody>
-          <a:bodyPr/>
-          <a:lstStyle/>
-          <a:p>
-            <a:fld id="{22289C57-55D7-40A4-A101-E74FAC7A092B}" type="slidenum">
-              <a:rPr lang="en-US" smtClean="0"/>
-              <a:t>4</a:t>
-            </a:fld>
-            <a:endParaRPr lang="en-US" dirty="0"/>
-          </a:p>
-        </p:txBody>
-      </p:sp>
-    </p:spTree>
-    <p:extLst>
-      <p:ext uri="{BB962C8B-B14F-4D97-AF65-F5344CB8AC3E}">
-        <p14:creationId xmlns:p14="http://schemas.microsoft.com/office/powerpoint/2010/main" val="3650354633"/>
-      </p:ext>
-    </p:extLst>
-  </p:cSld>
-  <p:clrMapOvr>
-    <a:masterClrMapping/>
-  </p:clrMapOvr>
-</p:notes>
-</file>
-
-<file path=ppt/notesSlides/notesSlide5.xml><?xml version="1.0" encoding="utf-8"?>
-<p:notes xmlns:a="http://schemas.openxmlformats.org/drawingml/2006/main" xmlns:r="http://schemas.openxmlformats.org/officeDocument/2006/relationships" xmlns:p="http://schemas.openxmlformats.org/presentationml/2006/main">
-  <p:cSld>
-    <p:spTree>
-      <p:nvGrpSpPr>
-        <p:cNvPr id="1" name=""/>
-        <p:cNvGrpSpPr/>
-        <p:nvPr/>
-      </p:nvGrpSpPr>
-      <p:grpSpPr>
-        <a:xfrm>
-          <a:off x="0" y="0"/>
-          <a:ext cx="0" cy="0"/>
-          <a:chOff x="0" y="0"/>
-          <a:chExt cx="0" cy="0"/>
-        </a:xfrm>
-      </p:grpSpPr>
-      <p:sp>
-        <p:nvSpPr>
-          <p:cNvPr id="2" name="Slide Image Placeholder 1"/>
-          <p:cNvSpPr>
-            <a:spLocks noGrp="1" noRot="1" noChangeAspect="1"/>
-          </p:cNvSpPr>
-          <p:nvPr>
-            <p:ph type="sldImg"/>
-          </p:nvPr>
-        </p:nvSpPr>
-        <p:spPr/>
-      </p:sp>
-      <p:sp>
-        <p:nvSpPr>
-          <p:cNvPr id="3" name="Notes Placeholder 2"/>
-          <p:cNvSpPr>
-            <a:spLocks noGrp="1"/>
-          </p:cNvSpPr>
-          <p:nvPr>
-            <p:ph type="body" idx="1"/>
-          </p:nvPr>
-        </p:nvSpPr>
-        <p:spPr/>
-        <p:txBody>
-          <a:bodyPr/>
-          <a:lstStyle/>
-          <a:p>
-            <a:pPr algn="l">
-              <a:buFont typeface="+mj-lt"/>
-              <a:buAutoNum type="arabicPeriod"/>
-            </a:pPr>
-            <a:endParaRPr lang="en-US" b="0" i="0" dirty="0">
-              <a:solidFill>
-                <a:srgbClr val="FFFFFF"/>
-              </a:solidFill>
-              <a:effectLst/>
-              <a:latin typeface="SegoeUIVariable"/>
-            </a:endParaRPr>
-          </a:p>
-        </p:txBody>
-      </p:sp>
-      <p:sp>
-        <p:nvSpPr>
-          <p:cNvPr id="4" name="Slide Number Placeholder 3"/>
-          <p:cNvSpPr>
-            <a:spLocks noGrp="1"/>
-          </p:cNvSpPr>
-          <p:nvPr>
-            <p:ph type="sldNum" sz="quarter" idx="5"/>
-          </p:nvPr>
-        </p:nvSpPr>
-        <p:spPr/>
-        <p:txBody>
-          <a:bodyPr/>
-          <a:lstStyle/>
-          <a:p>
-            <a:pPr marL="0" marR="0" lvl="0" indent="0" algn="r" defTabSz="914400" rtl="0" eaLnBrk="1" fontAlgn="auto" latinLnBrk="0" hangingPunct="1">
-              <a:lnSpc>
-                <a:spcPct val="100000"/>
-              </a:lnSpc>
-              <a:spcBef>
-                <a:spcPts val="0"/>
-              </a:spcBef>
-              <a:spcAft>
-                <a:spcPts val="0"/>
-              </a:spcAft>
-              <a:buClrTx/>
-              <a:buSzTx/>
-              <a:buFontTx/>
-              <a:buNone/>
-              <a:tabLst/>
-              <a:defRPr/>
-            </a:pPr>
-            <a:fld id="{22289C57-55D7-40A4-A101-E74FAC7A092B}" type="slidenum">
-              <a:rPr kumimoji="0" lang="en-US" sz="1200" b="0" i="0" u="none" strike="noStrike" kern="1200" cap="none" spc="0" normalizeH="0" baseline="0" noProof="0" smtClean="0">
-                <a:ln>
-                  <a:noFill/>
-                </a:ln>
-                <a:solidFill>
-                  <a:prstClr val="black"/>
-                </a:solidFill>
-                <a:effectLst/>
-                <a:uLnTx/>
-                <a:uFillTx/>
-                <a:latin typeface="Calibri" panose="020F0502020204030204"/>
-                <a:ea typeface="+mn-ea"/>
-                <a:cs typeface="+mn-cs"/>
-              </a:rPr>
-              <a:pPr marL="0" marR="0" lvl="0" indent="0" algn="r" defTabSz="914400" rtl="0" eaLnBrk="1" fontAlgn="auto" latinLnBrk="0" hangingPunct="1">
-                <a:lnSpc>
-                  <a:spcPct val="100000"/>
-                </a:lnSpc>
-                <a:spcBef>
-                  <a:spcPts val="0"/>
-                </a:spcBef>
-                <a:spcAft>
-                  <a:spcPts val="0"/>
-                </a:spcAft>
-                <a:buClrTx/>
-                <a:buSzTx/>
-                <a:buFontTx/>
-                <a:buNone/>
-                <a:tabLst/>
-                <a:defRPr/>
-              </a:pPr>
-              <a:t>5</a:t>
-            </a:fld>
-            <a:endParaRPr kumimoji="0" lang="en-US" sz="1200" b="0" i="0" u="none" strike="noStrike" kern="1200" cap="none" spc="0" normalizeH="0" baseline="0" noProof="0" dirty="0">
-              <a:ln>
-                <a:noFill/>
-              </a:ln>
-              <a:solidFill>
-                <a:prstClr val="black"/>
-              </a:solidFill>
-              <a:effectLst/>
-              <a:uLnTx/>
-              <a:uFillTx/>
-              <a:latin typeface="Calibri" panose="020F0502020204030204"/>
-              <a:ea typeface="+mn-ea"/>
-              <a:cs typeface="+mn-cs"/>
-            </a:endParaRPr>
-          </a:p>
-        </p:txBody>
-      </p:sp>
-    </p:spTree>
-    <p:extLst>
-      <p:ext uri="{BB962C8B-B14F-4D97-AF65-F5344CB8AC3E}">
-        <p14:creationId xmlns:p14="http://schemas.microsoft.com/office/powerpoint/2010/main" val="4001432699"/>
-      </p:ext>
-    </p:extLst>
-  </p:cSld>
-  <p:clrMapOvr>
-    <a:masterClrMapping/>
-  </p:clrMapOvr>
-</p:notes>
-</file>
-
-<file path=ppt/notesSlides/notesSlide6.xml><?xml version="1.0" encoding="utf-8"?>
-<p:notes xmlns:a="http://schemas.openxmlformats.org/drawingml/2006/main" xmlns:r="http://schemas.openxmlformats.org/officeDocument/2006/relationships" xmlns:p="http://schemas.openxmlformats.org/presentationml/2006/main">
-  <p:cSld>
-    <p:spTree>
-      <p:nvGrpSpPr>
-        <p:cNvPr id="1" name=""/>
-        <p:cNvGrpSpPr/>
-        <p:nvPr/>
-      </p:nvGrpSpPr>
-      <p:grpSpPr>
-        <a:xfrm>
-          <a:off x="0" y="0"/>
-          <a:ext cx="0" cy="0"/>
-          <a:chOff x="0" y="0"/>
-          <a:chExt cx="0" cy="0"/>
-        </a:xfrm>
-      </p:grpSpPr>
-      <p:sp>
-        <p:nvSpPr>
-          <p:cNvPr id="2" name="Slide Image Placeholder 1"/>
-          <p:cNvSpPr>
-            <a:spLocks noGrp="1" noRot="1" noChangeAspect="1"/>
-          </p:cNvSpPr>
-          <p:nvPr>
-            <p:ph type="sldImg"/>
-          </p:nvPr>
-        </p:nvSpPr>
-        <p:spPr/>
-      </p:sp>
-      <p:sp>
-        <p:nvSpPr>
-          <p:cNvPr id="3" name="Notes Placeholder 2"/>
-          <p:cNvSpPr>
-            <a:spLocks noGrp="1"/>
-          </p:cNvSpPr>
-          <p:nvPr>
-            <p:ph type="body" idx="1"/>
-          </p:nvPr>
-        </p:nvSpPr>
-        <p:spPr/>
-        <p:txBody>
-          <a:bodyPr/>
-          <a:lstStyle/>
-          <a:p>
-            <a:endParaRPr lang="en-US" dirty="0"/>
-          </a:p>
-        </p:txBody>
-      </p:sp>
-      <p:sp>
-        <p:nvSpPr>
-          <p:cNvPr id="4" name="Slide Number Placeholder 3"/>
-          <p:cNvSpPr>
-            <a:spLocks noGrp="1"/>
-          </p:cNvSpPr>
-          <p:nvPr>
-            <p:ph type="sldNum" sz="quarter" idx="5"/>
-          </p:nvPr>
-        </p:nvSpPr>
-        <p:spPr/>
-        <p:txBody>
-          <a:bodyPr/>
-          <a:lstStyle/>
-          <a:p>
-            <a:fld id="{22289C57-55D7-40A4-A101-E74FAC7A092B}" type="slidenum">
-              <a:rPr lang="en-US" smtClean="0"/>
-              <a:t>6</a:t>
-            </a:fld>
-            <a:endParaRPr lang="en-US" dirty="0"/>
-          </a:p>
-        </p:txBody>
-      </p:sp>
-    </p:spTree>
-    <p:extLst>
-      <p:ext uri="{BB962C8B-B14F-4D97-AF65-F5344CB8AC3E}">
-        <p14:creationId xmlns:p14="http://schemas.microsoft.com/office/powerpoint/2010/main" val="1477579286"/>
-      </p:ext>
-    </p:extLst>
-  </p:cSld>
-  <p:clrMapOvr>
-    <a:masterClrMapping/>
-  </p:clrMapOvr>
-</p:notes>
-</file>
-
-<file path=ppt/notesSlides/notesSlide7.xml><?xml version="1.0" encoding="utf-8"?>
 <p:notes xmlns:a="http://schemas.openxmlformats.org/drawingml/2006/main" xmlns:r="http://schemas.openxmlformats.org/officeDocument/2006/relationships" xmlns:p="http://schemas.openxmlformats.org/presentationml/2006/main">
   <p:cSld>
     <p:spTree>
@@ -3213,6 +2341,558 @@
 </file>
 
 <file path=ppt/slideLayouts/slideLayout13.xml><?xml version="1.0" encoding="utf-8"?>
+<p:sldLayout xmlns:a="http://schemas.openxmlformats.org/drawingml/2006/main" xmlns:r="http://schemas.openxmlformats.org/officeDocument/2006/relationships" xmlns:p="http://schemas.openxmlformats.org/presentationml/2006/main" preserve="1" userDrawn="1">
+  <p:cSld name="Custom Layout">
+    <p:spTree>
+      <p:nvGrpSpPr>
+        <p:cNvPr id="1" name=""/>
+        <p:cNvGrpSpPr/>
+        <p:nvPr/>
+      </p:nvGrpSpPr>
+      <p:grpSpPr>
+        <a:xfrm>
+          <a:off x="0" y="0"/>
+          <a:ext cx="0" cy="0"/>
+          <a:chOff x="0" y="0"/>
+          <a:chExt cx="0" cy="0"/>
+        </a:xfrm>
+      </p:grpSpPr>
+      <p:sp>
+        <p:nvSpPr>
+          <p:cNvPr id="2" name="Title 1">
+            <a:extLst>
+              <a:ext uri="{FF2B5EF4-FFF2-40B4-BE49-F238E27FC236}">
+                <a16:creationId xmlns:a16="http://schemas.microsoft.com/office/drawing/2014/main" id="{22AEA1C7-C47B-D617-F65A-2172692DBCBE}"/>
+              </a:ext>
+            </a:extLst>
+          </p:cNvPr>
+          <p:cNvSpPr>
+            <a:spLocks noGrp="1"/>
+          </p:cNvSpPr>
+          <p:nvPr>
+            <p:ph type="title"/>
+          </p:nvPr>
+        </p:nvSpPr>
+        <p:spPr>
+          <a:xfrm>
+            <a:off x="838200" y="365125"/>
+            <a:ext cx="10515600" cy="641639"/>
+          </a:xfrm>
+        </p:spPr>
+        <p:txBody>
+          <a:bodyPr/>
+          <a:lstStyle/>
+          <a:p>
+            <a:r>
+              <a:rPr lang="en-US" dirty="0"/>
+              <a:t>Click to edit Master title style</a:t>
+            </a:r>
+          </a:p>
+        </p:txBody>
+      </p:sp>
+      <p:sp>
+        <p:nvSpPr>
+          <p:cNvPr id="3" name="Date Placeholder 2">
+            <a:extLst>
+              <a:ext uri="{FF2B5EF4-FFF2-40B4-BE49-F238E27FC236}">
+                <a16:creationId xmlns:a16="http://schemas.microsoft.com/office/drawing/2014/main" id="{518546D9-C06A-A070-E1F2-E149A130FDCC}"/>
+              </a:ext>
+            </a:extLst>
+          </p:cNvPr>
+          <p:cNvSpPr>
+            <a:spLocks noGrp="1"/>
+          </p:cNvSpPr>
+          <p:nvPr>
+            <p:ph type="dt" sz="half" idx="10"/>
+          </p:nvPr>
+        </p:nvSpPr>
+        <p:spPr/>
+        <p:txBody>
+          <a:bodyPr/>
+          <a:lstStyle/>
+          <a:p>
+            <a:endParaRPr lang="en-US" dirty="0"/>
+          </a:p>
+        </p:txBody>
+      </p:sp>
+      <p:sp>
+        <p:nvSpPr>
+          <p:cNvPr id="4" name="Footer Placeholder 3">
+            <a:extLst>
+              <a:ext uri="{FF2B5EF4-FFF2-40B4-BE49-F238E27FC236}">
+                <a16:creationId xmlns:a16="http://schemas.microsoft.com/office/drawing/2014/main" id="{60DD84BE-2215-0F9D-96CB-B5E8CF2CC7D6}"/>
+              </a:ext>
+            </a:extLst>
+          </p:cNvPr>
+          <p:cNvSpPr>
+            <a:spLocks noGrp="1"/>
+          </p:cNvSpPr>
+          <p:nvPr>
+            <p:ph type="ftr" sz="quarter" idx="11"/>
+          </p:nvPr>
+        </p:nvSpPr>
+        <p:spPr/>
+        <p:txBody>
+          <a:bodyPr/>
+          <a:lstStyle/>
+          <a:p>
+            <a:r>
+              <a:rPr lang="en-US" dirty="0"/>
+              <a:t>PRESENTATION TITLE</a:t>
+            </a:r>
+          </a:p>
+        </p:txBody>
+      </p:sp>
+      <p:sp>
+        <p:nvSpPr>
+          <p:cNvPr id="5" name="Slide Number Placeholder 4">
+            <a:extLst>
+              <a:ext uri="{FF2B5EF4-FFF2-40B4-BE49-F238E27FC236}">
+                <a16:creationId xmlns:a16="http://schemas.microsoft.com/office/drawing/2014/main" id="{65ACB7BC-B801-FD31-8FA6-8B5E446A67F9}"/>
+              </a:ext>
+            </a:extLst>
+          </p:cNvPr>
+          <p:cNvSpPr>
+            <a:spLocks noGrp="1"/>
+          </p:cNvSpPr>
+          <p:nvPr>
+            <p:ph type="sldNum" sz="quarter" idx="12"/>
+          </p:nvPr>
+        </p:nvSpPr>
+        <p:spPr/>
+        <p:txBody>
+          <a:bodyPr/>
+          <a:lstStyle/>
+          <a:p>
+            <a:fld id="{A49DFD55-3C28-40EF-9E31-A92D2E4017FF}" type="slidenum">
+              <a:rPr lang="en-US" smtClean="0"/>
+              <a:t>‹#›</a:t>
+            </a:fld>
+            <a:endParaRPr lang="en-US" dirty="0"/>
+          </a:p>
+        </p:txBody>
+      </p:sp>
+      <p:sp>
+        <p:nvSpPr>
+          <p:cNvPr id="7" name="Text Placeholder 6">
+            <a:extLst>
+              <a:ext uri="{FF2B5EF4-FFF2-40B4-BE49-F238E27FC236}">
+                <a16:creationId xmlns:a16="http://schemas.microsoft.com/office/drawing/2014/main" id="{EE0FEBEF-437B-BE87-0A80-1938B0EF2C0C}"/>
+              </a:ext>
+            </a:extLst>
+          </p:cNvPr>
+          <p:cNvSpPr>
+            <a:spLocks noGrp="1"/>
+          </p:cNvSpPr>
+          <p:nvPr>
+            <p:ph type="body" sz="quarter" idx="13"/>
+          </p:nvPr>
+        </p:nvSpPr>
+        <p:spPr>
+          <a:xfrm>
+            <a:off x="838201" y="1930400"/>
+            <a:ext cx="6486236" cy="4303713"/>
+          </a:xfrm>
+        </p:spPr>
+        <p:txBody>
+          <a:bodyPr/>
+          <a:lstStyle/>
+          <a:p>
+            <a:pPr lvl="0"/>
+            <a:r>
+              <a:rPr lang="en-US"/>
+              <a:t>Click to edit Master text styles</a:t>
+            </a:r>
+          </a:p>
+          <a:p>
+            <a:pPr lvl="1"/>
+            <a:r>
+              <a:rPr lang="en-US"/>
+              <a:t>Second level</a:t>
+            </a:r>
+          </a:p>
+          <a:p>
+            <a:pPr lvl="2"/>
+            <a:r>
+              <a:rPr lang="en-US"/>
+              <a:t>Third level</a:t>
+            </a:r>
+          </a:p>
+          <a:p>
+            <a:pPr lvl="3"/>
+            <a:r>
+              <a:rPr lang="en-US"/>
+              <a:t>Fourth level</a:t>
+            </a:r>
+          </a:p>
+          <a:p>
+            <a:pPr lvl="4"/>
+            <a:r>
+              <a:rPr lang="en-US"/>
+              <a:t>Fifth level</a:t>
+            </a:r>
+          </a:p>
+        </p:txBody>
+      </p:sp>
+      <p:sp>
+        <p:nvSpPr>
+          <p:cNvPr id="9" name="Table Placeholder 8">
+            <a:extLst>
+              <a:ext uri="{FF2B5EF4-FFF2-40B4-BE49-F238E27FC236}">
+                <a16:creationId xmlns:a16="http://schemas.microsoft.com/office/drawing/2014/main" id="{5865C7B4-5DAA-C7DA-D840-62C6FC15A68D}"/>
+              </a:ext>
+            </a:extLst>
+          </p:cNvPr>
+          <p:cNvSpPr>
+            <a:spLocks noGrp="1"/>
+          </p:cNvSpPr>
+          <p:nvPr>
+            <p:ph type="tbl" sz="quarter" idx="14"/>
+          </p:nvPr>
+        </p:nvSpPr>
+        <p:spPr>
+          <a:xfrm>
+            <a:off x="7472363" y="2032000"/>
+            <a:ext cx="4119562" cy="3989388"/>
+          </a:xfrm>
+        </p:spPr>
+        <p:txBody>
+          <a:bodyPr/>
+          <a:lstStyle/>
+          <a:p>
+            <a:endParaRPr lang="en-US" dirty="0"/>
+          </a:p>
+        </p:txBody>
+      </p:sp>
+      <p:sp>
+        <p:nvSpPr>
+          <p:cNvPr id="10" name="Title 1">
+            <a:extLst>
+              <a:ext uri="{FF2B5EF4-FFF2-40B4-BE49-F238E27FC236}">
+                <a16:creationId xmlns:a16="http://schemas.microsoft.com/office/drawing/2014/main" id="{059B98D5-B867-0EA8-CB2A-9DB27681D2A5}"/>
+              </a:ext>
+            </a:extLst>
+          </p:cNvPr>
+          <p:cNvSpPr txBox="1">
+            <a:spLocks/>
+          </p:cNvSpPr>
+          <p:nvPr userDrawn="1"/>
+        </p:nvSpPr>
+        <p:spPr>
+          <a:xfrm>
+            <a:off x="925945" y="1096963"/>
+            <a:ext cx="10515600" cy="641639"/>
+          </a:xfrm>
+          <a:prstGeom prst="rect">
+            <a:avLst/>
+          </a:prstGeom>
+        </p:spPr>
+        <p:txBody>
+          <a:bodyPr vert="horz" lIns="91440" tIns="45720" rIns="91440" bIns="45720" rtlCol="0" anchor="ctr">
+            <a:normAutofit/>
+          </a:bodyPr>
+          <a:lstStyle>
+            <a:lvl1pPr algn="l" defTabSz="914400" rtl="0" eaLnBrk="1" latinLnBrk="0" hangingPunct="1">
+              <a:lnSpc>
+                <a:spcPct val="90000"/>
+              </a:lnSpc>
+              <a:spcBef>
+                <a:spcPct val="0"/>
+              </a:spcBef>
+              <a:buNone/>
+              <a:defRPr sz="4400" kern="1200" cap="all" baseline="0">
+                <a:solidFill>
+                  <a:schemeClr val="tx1"/>
+                </a:solidFill>
+                <a:latin typeface="+mj-lt"/>
+                <a:ea typeface="+mj-ea"/>
+                <a:cs typeface="+mj-cs"/>
+              </a:defRPr>
+            </a:lvl1pPr>
+          </a:lstStyle>
+          <a:p>
+            <a:r>
+              <a:rPr lang="en-US" sz="2800" dirty="0"/>
+              <a:t>subtitle</a:t>
+            </a:r>
+          </a:p>
+        </p:txBody>
+      </p:sp>
+    </p:spTree>
+    <p:extLst>
+      <p:ext uri="{BB962C8B-B14F-4D97-AF65-F5344CB8AC3E}">
+        <p14:creationId xmlns:p14="http://schemas.microsoft.com/office/powerpoint/2010/main" val="1346721444"/>
+      </p:ext>
+    </p:extLst>
+  </p:cSld>
+  <p:clrMapOvr>
+    <a:masterClrMapping/>
+  </p:clrMapOvr>
+</p:sldLayout>
+</file>
+
+<file path=ppt/slideLayouts/slideLayout14.xml><?xml version="1.0" encoding="utf-8"?>
+<p:sldLayout xmlns:a="http://schemas.openxmlformats.org/drawingml/2006/main" xmlns:r="http://schemas.openxmlformats.org/officeDocument/2006/relationships" xmlns:p="http://schemas.openxmlformats.org/presentationml/2006/main" preserve="1" userDrawn="1">
+  <p:cSld name="1_Custom Layout">
+    <p:spTree>
+      <p:nvGrpSpPr>
+        <p:cNvPr id="1" name=""/>
+        <p:cNvGrpSpPr/>
+        <p:nvPr/>
+      </p:nvGrpSpPr>
+      <p:grpSpPr>
+        <a:xfrm>
+          <a:off x="0" y="0"/>
+          <a:ext cx="0" cy="0"/>
+          <a:chOff x="0" y="0"/>
+          <a:chExt cx="0" cy="0"/>
+        </a:xfrm>
+      </p:grpSpPr>
+      <p:sp>
+        <p:nvSpPr>
+          <p:cNvPr id="2" name="Title 1">
+            <a:extLst>
+              <a:ext uri="{FF2B5EF4-FFF2-40B4-BE49-F238E27FC236}">
+                <a16:creationId xmlns:a16="http://schemas.microsoft.com/office/drawing/2014/main" id="{22AEA1C7-C47B-D617-F65A-2172692DBCBE}"/>
+              </a:ext>
+            </a:extLst>
+          </p:cNvPr>
+          <p:cNvSpPr>
+            <a:spLocks noGrp="1"/>
+          </p:cNvSpPr>
+          <p:nvPr>
+            <p:ph type="title"/>
+          </p:nvPr>
+        </p:nvSpPr>
+        <p:spPr>
+          <a:xfrm>
+            <a:off x="838200" y="365125"/>
+            <a:ext cx="10515600" cy="641639"/>
+          </a:xfrm>
+        </p:spPr>
+        <p:txBody>
+          <a:bodyPr/>
+          <a:lstStyle/>
+          <a:p>
+            <a:r>
+              <a:rPr lang="en-US" dirty="0"/>
+              <a:t>Click to edit Master title style</a:t>
+            </a:r>
+          </a:p>
+        </p:txBody>
+      </p:sp>
+      <p:sp>
+        <p:nvSpPr>
+          <p:cNvPr id="3" name="Date Placeholder 2">
+            <a:extLst>
+              <a:ext uri="{FF2B5EF4-FFF2-40B4-BE49-F238E27FC236}">
+                <a16:creationId xmlns:a16="http://schemas.microsoft.com/office/drawing/2014/main" id="{518546D9-C06A-A070-E1F2-E149A130FDCC}"/>
+              </a:ext>
+            </a:extLst>
+          </p:cNvPr>
+          <p:cNvSpPr>
+            <a:spLocks noGrp="1"/>
+          </p:cNvSpPr>
+          <p:nvPr>
+            <p:ph type="dt" sz="half" idx="10"/>
+          </p:nvPr>
+        </p:nvSpPr>
+        <p:spPr/>
+        <p:txBody>
+          <a:bodyPr/>
+          <a:lstStyle/>
+          <a:p>
+            <a:endParaRPr lang="en-US" dirty="0"/>
+          </a:p>
+        </p:txBody>
+      </p:sp>
+      <p:sp>
+        <p:nvSpPr>
+          <p:cNvPr id="4" name="Footer Placeholder 3">
+            <a:extLst>
+              <a:ext uri="{FF2B5EF4-FFF2-40B4-BE49-F238E27FC236}">
+                <a16:creationId xmlns:a16="http://schemas.microsoft.com/office/drawing/2014/main" id="{60DD84BE-2215-0F9D-96CB-B5E8CF2CC7D6}"/>
+              </a:ext>
+            </a:extLst>
+          </p:cNvPr>
+          <p:cNvSpPr>
+            <a:spLocks noGrp="1"/>
+          </p:cNvSpPr>
+          <p:nvPr>
+            <p:ph type="ftr" sz="quarter" idx="11"/>
+          </p:nvPr>
+        </p:nvSpPr>
+        <p:spPr/>
+        <p:txBody>
+          <a:bodyPr/>
+          <a:lstStyle/>
+          <a:p>
+            <a:r>
+              <a:rPr lang="en-US" dirty="0"/>
+              <a:t>PRESENTATION TITLE</a:t>
+            </a:r>
+          </a:p>
+        </p:txBody>
+      </p:sp>
+      <p:sp>
+        <p:nvSpPr>
+          <p:cNvPr id="5" name="Slide Number Placeholder 4">
+            <a:extLst>
+              <a:ext uri="{FF2B5EF4-FFF2-40B4-BE49-F238E27FC236}">
+                <a16:creationId xmlns:a16="http://schemas.microsoft.com/office/drawing/2014/main" id="{65ACB7BC-B801-FD31-8FA6-8B5E446A67F9}"/>
+              </a:ext>
+            </a:extLst>
+          </p:cNvPr>
+          <p:cNvSpPr>
+            <a:spLocks noGrp="1"/>
+          </p:cNvSpPr>
+          <p:nvPr>
+            <p:ph type="sldNum" sz="quarter" idx="12"/>
+          </p:nvPr>
+        </p:nvSpPr>
+        <p:spPr/>
+        <p:txBody>
+          <a:bodyPr/>
+          <a:lstStyle/>
+          <a:p>
+            <a:fld id="{A49DFD55-3C28-40EF-9E31-A92D2E4017FF}" type="slidenum">
+              <a:rPr lang="en-US" smtClean="0"/>
+              <a:t>‹#›</a:t>
+            </a:fld>
+            <a:endParaRPr lang="en-US" dirty="0"/>
+          </a:p>
+        </p:txBody>
+      </p:sp>
+      <p:sp>
+        <p:nvSpPr>
+          <p:cNvPr id="7" name="Text Placeholder 6">
+            <a:extLst>
+              <a:ext uri="{FF2B5EF4-FFF2-40B4-BE49-F238E27FC236}">
+                <a16:creationId xmlns:a16="http://schemas.microsoft.com/office/drawing/2014/main" id="{EE0FEBEF-437B-BE87-0A80-1938B0EF2C0C}"/>
+              </a:ext>
+            </a:extLst>
+          </p:cNvPr>
+          <p:cNvSpPr>
+            <a:spLocks noGrp="1"/>
+          </p:cNvSpPr>
+          <p:nvPr>
+            <p:ph type="body" sz="quarter" idx="13"/>
+          </p:nvPr>
+        </p:nvSpPr>
+        <p:spPr>
+          <a:xfrm>
+            <a:off x="838201" y="1930400"/>
+            <a:ext cx="10603344" cy="4303713"/>
+          </a:xfrm>
+        </p:spPr>
+        <p:txBody>
+          <a:bodyPr/>
+          <a:lstStyle/>
+          <a:p>
+            <a:pPr lvl="0"/>
+            <a:r>
+              <a:rPr lang="en-US"/>
+              <a:t>Click to edit Master text styles</a:t>
+            </a:r>
+          </a:p>
+          <a:p>
+            <a:pPr lvl="1"/>
+            <a:r>
+              <a:rPr lang="en-US"/>
+              <a:t>Second level</a:t>
+            </a:r>
+          </a:p>
+          <a:p>
+            <a:pPr lvl="2"/>
+            <a:r>
+              <a:rPr lang="en-US"/>
+              <a:t>Third level</a:t>
+            </a:r>
+          </a:p>
+          <a:p>
+            <a:pPr lvl="3"/>
+            <a:r>
+              <a:rPr lang="en-US"/>
+              <a:t>Fourth level</a:t>
+            </a:r>
+          </a:p>
+          <a:p>
+            <a:pPr lvl="4"/>
+            <a:r>
+              <a:rPr lang="en-US"/>
+              <a:t>Fifth level</a:t>
+            </a:r>
+          </a:p>
+        </p:txBody>
+      </p:sp>
+      <p:sp>
+        <p:nvSpPr>
+          <p:cNvPr id="10" name="Title 1">
+            <a:extLst>
+              <a:ext uri="{FF2B5EF4-FFF2-40B4-BE49-F238E27FC236}">
+                <a16:creationId xmlns:a16="http://schemas.microsoft.com/office/drawing/2014/main" id="{059B98D5-B867-0EA8-CB2A-9DB27681D2A5}"/>
+              </a:ext>
+            </a:extLst>
+          </p:cNvPr>
+          <p:cNvSpPr txBox="1">
+            <a:spLocks/>
+          </p:cNvSpPr>
+          <p:nvPr userDrawn="1"/>
+        </p:nvSpPr>
+        <p:spPr>
+          <a:xfrm>
+            <a:off x="925945" y="1096963"/>
+            <a:ext cx="10515600" cy="641639"/>
+          </a:xfrm>
+          <a:prstGeom prst="rect">
+            <a:avLst/>
+          </a:prstGeom>
+        </p:spPr>
+        <p:txBody>
+          <a:bodyPr vert="horz" lIns="91440" tIns="45720" rIns="91440" bIns="45720" rtlCol="0" anchor="ctr">
+            <a:normAutofit/>
+          </a:bodyPr>
+          <a:lstStyle>
+            <a:lvl1pPr algn="l" defTabSz="914400" rtl="0" eaLnBrk="1" latinLnBrk="0" hangingPunct="1">
+              <a:lnSpc>
+                <a:spcPct val="90000"/>
+              </a:lnSpc>
+              <a:spcBef>
+                <a:spcPct val="0"/>
+              </a:spcBef>
+              <a:buNone/>
+              <a:defRPr sz="4400" kern="1200" cap="all" baseline="0">
+                <a:solidFill>
+                  <a:schemeClr val="tx1"/>
+                </a:solidFill>
+                <a:latin typeface="+mj-lt"/>
+                <a:ea typeface="+mj-ea"/>
+                <a:cs typeface="+mj-cs"/>
+              </a:defRPr>
+            </a:lvl1pPr>
+          </a:lstStyle>
+          <a:p>
+            <a:r>
+              <a:rPr lang="en-US" sz="2800" dirty="0"/>
+              <a:t>subtitle</a:t>
+            </a:r>
+          </a:p>
+        </p:txBody>
+      </p:sp>
+    </p:spTree>
+    <p:extLst>
+      <p:ext uri="{BB962C8B-B14F-4D97-AF65-F5344CB8AC3E}">
+        <p14:creationId xmlns:p14="http://schemas.microsoft.com/office/powerpoint/2010/main" val="4102534786"/>
+      </p:ext>
+    </p:extLst>
+  </p:cSld>
+  <p:clrMapOvr>
+    <a:masterClrMapping/>
+  </p:clrMapOvr>
+</p:sldLayout>
+</file>
+
+<file path=ppt/slideLayouts/slideLayout15.xml><?xml version="1.0" encoding="utf-8"?>
 <p:sldLayout xmlns:a="http://schemas.openxmlformats.org/drawingml/2006/main" xmlns:r="http://schemas.openxmlformats.org/officeDocument/2006/relationships" xmlns:p="http://schemas.openxmlformats.org/presentationml/2006/main" type="title" preserve="1">
   <p:cSld name="Closing">
     <p:bg>
@@ -6853,7 +6533,9 @@
     <p:sldLayoutId id="2147483674" r:id="rId10"/>
     <p:sldLayoutId id="2147483653" r:id="rId11"/>
     <p:sldLayoutId id="2147483667" r:id="rId12"/>
-    <p:sldLayoutId id="2147483665" r:id="rId13"/>
+    <p:sldLayoutId id="2147483675" r:id="rId13"/>
+    <p:sldLayoutId id="2147483676" r:id="rId14"/>
+    <p:sldLayoutId id="2147483665" r:id="rId15"/>
   </p:sldLayoutIdLst>
   <p:hf hdr="0" ftr="0" dt="0"/>
   <p:txStyles>
@@ -7174,8 +6856,8 @@
         </p:nvSpPr>
         <p:spPr>
           <a:xfrm>
-            <a:off x="6441918" y="3329790"/>
-            <a:ext cx="4941771" cy="3200400"/>
+            <a:off x="5862320" y="3329790"/>
+            <a:ext cx="5521369" cy="3200400"/>
           </a:xfrm>
         </p:spPr>
         <p:txBody>
@@ -7184,7 +6866,7 @@
           <a:p>
             <a:r>
               <a:rPr lang="en-US" dirty="0"/>
-              <a:t>Top 2024 AI trends</a:t>
+              <a:t>2024 Election – super Tuesday outcomes</a:t>
             </a:r>
             <a:br>
               <a:rPr lang="en-US" dirty="0"/>
@@ -7193,22 +6875,34 @@
               <a:rPr lang="en-US" dirty="0"/>
             </a:br>
             <a:r>
+              <a:rPr lang="en-US" dirty="0"/>
+              <a:t>“</a:t>
+            </a:r>
+            <a:r>
+              <a:rPr lang="en-US" sz="2400" dirty="0">
+                <a:highlight>
+                  <a:srgbClr val="FFFF00"/>
+                </a:highlight>
+              </a:rPr>
+              <a:t>A catchy description about our project</a:t>
+            </a:r>
+            <a:r>
               <a:rPr lang="en-US" sz="2400" dirty="0"/>
-              <a:t>by   : Koohyar Pooladvand </a:t>
+              <a:t>”</a:t>
             </a:r>
             <a:br>
               <a:rPr lang="en-US" sz="2400" dirty="0"/>
             </a:br>
             <a:r>
               <a:rPr lang="en-US" sz="2400" dirty="0"/>
-              <a:t>For : DATA607</a:t>
+              <a:t>For : DATA607 – Project 3</a:t>
             </a:r>
             <a:br>
               <a:rPr lang="en-US" sz="2400" dirty="0"/>
             </a:br>
             <a:fld id="{C3EDA88D-555A-494C-8ABF-CA7B789E1929}" type="datetime4">
               <a:rPr lang="en-US" sz="2400" smtClean="0"/>
-              <a:t>March 16, 2024</a:t>
+              <a:t>March 18, 2024</a:t>
             </a:fld>
             <a:endParaRPr lang="en-US" dirty="0"/>
           </a:p>
@@ -7306,26 +7000,34 @@
           <a:lstStyle/>
           <a:p>
             <a:r>
-              <a:rPr lang="en-US" dirty="0"/>
-              <a:t>LLM &amp; AI Stack</a:t>
-            </a:r>
-          </a:p>
-          <a:p>
-            <a:r>
-              <a:rPr lang="en-US" dirty="0"/>
-              <a:t>Team Structure</a:t>
-            </a:r>
-          </a:p>
-          <a:p>
-            <a:r>
-              <a:rPr lang="en-US" dirty="0"/>
-              <a:t>RAG</a:t>
-            </a:r>
-          </a:p>
-          <a:p>
-            <a:r>
-              <a:rPr lang="en-US" dirty="0"/>
-              <a:t>Data downsizing</a:t>
+              <a:rPr lang="en-US" b="1" dirty="0"/>
+              <a:t>What and Why: </a:t>
+            </a:r>
+            <a:r>
+              <a:rPr lang="en-US" dirty="0"/>
+              <a:t>Why this topic and what are our goals</a:t>
+            </a:r>
+          </a:p>
+          <a:p>
+            <a:r>
+              <a:rPr lang="en-US" b="1" dirty="0"/>
+              <a:t>How: </a:t>
+            </a:r>
+            <a:r>
+              <a:rPr lang="en-US" dirty="0"/>
+              <a:t>Data gathering, transformation, analyses</a:t>
+            </a:r>
+          </a:p>
+          <a:p>
+            <a:r>
+              <a:rPr lang="en-US" dirty="0"/>
+              <a:t>What they say</a:t>
+            </a:r>
+          </a:p>
+          <a:p>
+            <a:r>
+              <a:rPr lang="en-US" b="1" dirty="0"/>
+              <a:t>Lesson learned </a:t>
             </a:r>
           </a:p>
         </p:txBody>
@@ -7397,10 +7099,10 @@
       </p:grpSpPr>
       <p:sp>
         <p:nvSpPr>
-          <p:cNvPr id="2" name="Title 1">
-            <a:extLst>
-              <a:ext uri="{FF2B5EF4-FFF2-40B4-BE49-F238E27FC236}">
-                <a16:creationId xmlns:a16="http://schemas.microsoft.com/office/drawing/2014/main" id="{9528DBD1-DB29-D44F-FD5A-3071BB37EF37}"/>
+          <p:cNvPr id="5" name="Title 4">
+            <a:extLst>
+              <a:ext uri="{FF2B5EF4-FFF2-40B4-BE49-F238E27FC236}">
+                <a16:creationId xmlns:a16="http://schemas.microsoft.com/office/drawing/2014/main" id="{14768BED-BB58-474B-18D1-E03C6692B304}"/>
               </a:ext>
             </a:extLst>
           </p:cNvPr>
@@ -7418,25 +7120,25 @@
           <a:p>
             <a:r>
               <a:rPr lang="en-US" dirty="0"/>
-              <a:t>The Power of LLM</a:t>
-            </a:r>
-          </a:p>
-        </p:txBody>
-      </p:sp>
-      <p:sp>
-        <p:nvSpPr>
-          <p:cNvPr id="3" name="Text Placeholder 2">
-            <a:extLst>
-              <a:ext uri="{FF2B5EF4-FFF2-40B4-BE49-F238E27FC236}">
-                <a16:creationId xmlns:a16="http://schemas.microsoft.com/office/drawing/2014/main" id="{726B12F0-0992-FDEA-E538-7182599D43D0}"/>
-              </a:ext>
-            </a:extLst>
-          </p:cNvPr>
-          <p:cNvSpPr>
-            <a:spLocks noGrp="1"/>
-          </p:cNvSpPr>
-          <p:nvPr>
-            <p:ph type="body" idx="1"/>
+              <a:t>What and Why</a:t>
+            </a:r>
+          </a:p>
+        </p:txBody>
+      </p:sp>
+      <p:sp>
+        <p:nvSpPr>
+          <p:cNvPr id="6" name="Table Placeholder 5">
+            <a:extLst>
+              <a:ext uri="{FF2B5EF4-FFF2-40B4-BE49-F238E27FC236}">
+                <a16:creationId xmlns:a16="http://schemas.microsoft.com/office/drawing/2014/main" id="{9492D01A-B138-6853-53B7-0B23887E5406}"/>
+              </a:ext>
+            </a:extLst>
+          </p:cNvPr>
+          <p:cNvSpPr>
+            <a:spLocks noGrp="1"/>
+          </p:cNvSpPr>
+          <p:nvPr>
+            <p:ph type="tbl" sz="quarter" idx="14"/>
           </p:nvPr>
         </p:nvSpPr>
         <p:spPr/>
@@ -7446,25 +7148,25 @@
           <a:p>
             <a:r>
               <a:rPr lang="en-US" dirty="0"/>
-              <a:t>What</a:t>
-            </a:r>
-          </a:p>
-        </p:txBody>
-      </p:sp>
-      <p:sp>
-        <p:nvSpPr>
-          <p:cNvPr id="6" name="Content Placeholder 5">
-            <a:extLst>
-              <a:ext uri="{FF2B5EF4-FFF2-40B4-BE49-F238E27FC236}">
-                <a16:creationId xmlns:a16="http://schemas.microsoft.com/office/drawing/2014/main" id="{D5B82FB3-62C6-547E-9BF2-23B7B586F204}"/>
-              </a:ext>
-            </a:extLst>
-          </p:cNvPr>
-          <p:cNvSpPr>
-            <a:spLocks noGrp="1"/>
-          </p:cNvSpPr>
-          <p:nvPr>
-            <p:ph sz="half" idx="15"/>
+              <a:t>Why we chose this topic, what question we wanted to answer, what we expected to get done, and why it is important (hypothesis and goals) </a:t>
+            </a:r>
+          </a:p>
+        </p:txBody>
+      </p:sp>
+      <p:sp>
+        <p:nvSpPr>
+          <p:cNvPr id="4" name="Slide Number Placeholder 3">
+            <a:extLst>
+              <a:ext uri="{FF2B5EF4-FFF2-40B4-BE49-F238E27FC236}">
+                <a16:creationId xmlns:a16="http://schemas.microsoft.com/office/drawing/2014/main" id="{F412CF62-3B03-D2FB-50C5-428783F730E1}"/>
+              </a:ext>
+            </a:extLst>
+          </p:cNvPr>
+          <p:cNvSpPr>
+            <a:spLocks noGrp="1"/>
+          </p:cNvSpPr>
+          <p:nvPr>
+            <p:ph type="sldNum" sz="quarter" idx="12"/>
           </p:nvPr>
         </p:nvSpPr>
         <p:spPr/>
@@ -7472,144 +7174,11 @@
           <a:bodyPr/>
           <a:lstStyle/>
           <a:p>
-            <a:pPr marL="0" indent="0">
-              <a:buNone/>
-            </a:pPr>
-            <a:r>
-              <a:rPr lang="en-US" b="1" dirty="0"/>
-              <a:t>LLM &amp; AI Stack:</a:t>
-            </a:r>
-            <a:r>
-              <a:rPr lang="en-US" dirty="0"/>
-              <a:t> Large Language model:</a:t>
-            </a:r>
-          </a:p>
-          <a:p>
-            <a:pPr marL="0" indent="0">
-              <a:buNone/>
-            </a:pPr>
-            <a:r>
-              <a:rPr lang="en-US" dirty="0"/>
-              <a:t>like ChatGPT, CoPilot (MS), Gemini/BARD (Google), AI (Watson)</a:t>
-            </a:r>
-          </a:p>
-          <a:p>
-            <a:pPr marL="0" indent="0">
-              <a:buNone/>
-            </a:pPr>
-            <a:r>
-              <a:rPr lang="en-US" dirty="0"/>
-              <a:t>Where: Used in complex areas, like In GenAI (Fashion), Literature, … </a:t>
-            </a:r>
-          </a:p>
-        </p:txBody>
-      </p:sp>
-      <p:sp>
-        <p:nvSpPr>
-          <p:cNvPr id="4" name="Text Placeholder 3">
-            <a:extLst>
-              <a:ext uri="{FF2B5EF4-FFF2-40B4-BE49-F238E27FC236}">
-                <a16:creationId xmlns:a16="http://schemas.microsoft.com/office/drawing/2014/main" id="{AE6B76D1-DA93-E5FE-A0A2-AB3DBDF7A938}"/>
-              </a:ext>
-            </a:extLst>
-          </p:cNvPr>
-          <p:cNvSpPr>
-            <a:spLocks noGrp="1"/>
-          </p:cNvSpPr>
-          <p:nvPr>
-            <p:ph type="body" idx="10"/>
-          </p:nvPr>
-        </p:nvSpPr>
-        <p:spPr/>
-        <p:txBody>
-          <a:bodyPr/>
-          <a:lstStyle/>
-          <a:p>
-            <a:r>
-              <a:rPr lang="en-US" dirty="0"/>
-              <a:t>How and Why</a:t>
-            </a:r>
-          </a:p>
-        </p:txBody>
-      </p:sp>
-      <p:sp>
-        <p:nvSpPr>
-          <p:cNvPr id="5" name="Content Placeholder 4">
-            <a:extLst>
-              <a:ext uri="{FF2B5EF4-FFF2-40B4-BE49-F238E27FC236}">
-                <a16:creationId xmlns:a16="http://schemas.microsoft.com/office/drawing/2014/main" id="{97545A84-99EE-17C7-C9BE-648829A8DB4C}"/>
-              </a:ext>
-            </a:extLst>
-          </p:cNvPr>
-          <p:cNvSpPr>
-            <a:spLocks noGrp="1"/>
-          </p:cNvSpPr>
-          <p:nvPr>
-            <p:ph sz="half" idx="14"/>
-          </p:nvPr>
-        </p:nvSpPr>
-        <p:spPr/>
-        <p:txBody>
-          <a:bodyPr/>
-          <a:lstStyle/>
-          <a:p>
-            <a:pPr marL="285750" indent="-285750">
-              <a:buFont typeface="Arial" panose="020B0604020202020204" pitchFamily="34" charset="0"/>
-              <a:buChar char="•"/>
-            </a:pPr>
-            <a:r>
-              <a:rPr lang="en-US" b="1" dirty="0"/>
-              <a:t>Vector databases</a:t>
-            </a:r>
-            <a:r>
-              <a:rPr lang="en-US" dirty="0"/>
-              <a:t> (a.k.a, the “</a:t>
-            </a:r>
-            <a:r>
-              <a:rPr lang="en-US" b="1" dirty="0"/>
-              <a:t>AI stack</a:t>
-            </a:r>
-            <a:r>
-              <a:rPr lang="en-US" dirty="0"/>
-              <a:t>”), to bridge the gap between LLM and efficient data representation.</a:t>
-            </a:r>
-          </a:p>
-          <a:p>
-            <a:pPr marL="569214" lvl="1"/>
-            <a:r>
-              <a:rPr lang="en-US" sz="1600" b="0" i="0" dirty="0">
-                <a:effectLst/>
-                <a:latin typeface="SegoeUIVariable"/>
-              </a:rPr>
-              <a:t>The combination of LLMs and vector databases has become the </a:t>
-            </a:r>
-            <a:r>
-              <a:rPr lang="en-US" sz="1600" b="1" i="0" dirty="0">
-                <a:effectLst/>
-                <a:latin typeface="SegoeUIVariable"/>
-              </a:rPr>
-              <a:t>key stack</a:t>
-            </a:r>
-            <a:r>
-              <a:rPr lang="en-US" sz="1600" b="0" i="0" dirty="0">
-                <a:effectLst/>
-                <a:latin typeface="SegoeUIVariable"/>
-              </a:rPr>
-              <a:t> for building generative AI applications.</a:t>
-            </a:r>
-          </a:p>
-          <a:p>
-            <a:pPr marL="569214" lvl="1"/>
-            <a:r>
-              <a:rPr lang="en-US" sz="1600" b="0" i="0" dirty="0">
-                <a:effectLst/>
-                <a:latin typeface="SegoeUIVariable"/>
-              </a:rPr>
-              <a:t>Together, they empower AI systems to understand, reason, and generate content more effectively.</a:t>
-            </a:r>
-          </a:p>
-          <a:p>
-            <a:pPr marL="569214" lvl="1"/>
+            <a:fld id="{A49DFD55-3C28-40EF-9E31-A92D2E4017FF}" type="slidenum">
+              <a:rPr lang="en-US" smtClean="0"/>
+              <a:pPr/>
+              <a:t>3</a:t>
+            </a:fld>
             <a:endParaRPr lang="en-US" dirty="0"/>
           </a:p>
         </p:txBody>
@@ -7617,7 +7186,7 @@
     </p:spTree>
     <p:extLst>
       <p:ext uri="{BB962C8B-B14F-4D97-AF65-F5344CB8AC3E}">
-        <p14:creationId xmlns:p14="http://schemas.microsoft.com/office/powerpoint/2010/main" val="608796113"/>
+        <p14:creationId xmlns:p14="http://schemas.microsoft.com/office/powerpoint/2010/main" val="3290640446"/>
       </p:ext>
     </p:extLst>
   </p:cSld>
@@ -7646,10 +7215,10 @@
       </p:grpSpPr>
       <p:sp>
         <p:nvSpPr>
-          <p:cNvPr id="2" name="Title 1">
-            <a:extLst>
-              <a:ext uri="{FF2B5EF4-FFF2-40B4-BE49-F238E27FC236}">
-                <a16:creationId xmlns:a16="http://schemas.microsoft.com/office/drawing/2014/main" id="{9528DBD1-DB29-D44F-FD5A-3071BB37EF37}"/>
+          <p:cNvPr id="5" name="Title 4">
+            <a:extLst>
+              <a:ext uri="{FF2B5EF4-FFF2-40B4-BE49-F238E27FC236}">
+                <a16:creationId xmlns:a16="http://schemas.microsoft.com/office/drawing/2014/main" id="{14768BED-BB58-474B-18D1-E03C6692B304}"/>
               </a:ext>
             </a:extLst>
           </p:cNvPr>
@@ -7667,25 +7236,25 @@
           <a:p>
             <a:r>
               <a:rPr lang="en-US" dirty="0"/>
-              <a:t>Restructure of data team like software team</a:t>
-            </a:r>
-          </a:p>
-        </p:txBody>
-      </p:sp>
-      <p:sp>
-        <p:nvSpPr>
-          <p:cNvPr id="3" name="Text Placeholder 2">
-            <a:extLst>
-              <a:ext uri="{FF2B5EF4-FFF2-40B4-BE49-F238E27FC236}">
-                <a16:creationId xmlns:a16="http://schemas.microsoft.com/office/drawing/2014/main" id="{726B12F0-0992-FDEA-E538-7182599D43D0}"/>
-              </a:ext>
-            </a:extLst>
-          </p:cNvPr>
-          <p:cNvSpPr>
-            <a:spLocks noGrp="1"/>
-          </p:cNvSpPr>
-          <p:nvPr>
-            <p:ph type="body" idx="1"/>
+              <a:t>How: How we gather the data</a:t>
+            </a:r>
+          </a:p>
+        </p:txBody>
+      </p:sp>
+      <p:sp>
+        <p:nvSpPr>
+          <p:cNvPr id="6" name="Table Placeholder 5">
+            <a:extLst>
+              <a:ext uri="{FF2B5EF4-FFF2-40B4-BE49-F238E27FC236}">
+                <a16:creationId xmlns:a16="http://schemas.microsoft.com/office/drawing/2014/main" id="{9492D01A-B138-6853-53B7-0B23887E5406}"/>
+              </a:ext>
+            </a:extLst>
+          </p:cNvPr>
+          <p:cNvSpPr>
+            <a:spLocks noGrp="1"/>
+          </p:cNvSpPr>
+          <p:nvPr>
+            <p:ph type="tbl" sz="quarter" idx="14"/>
           </p:nvPr>
         </p:nvSpPr>
         <p:spPr/>
@@ -7695,71 +7264,31 @@
           <a:p>
             <a:r>
               <a:rPr lang="en-US" dirty="0"/>
-              <a:t>What</a:t>
-            </a:r>
-          </a:p>
-        </p:txBody>
-      </p:sp>
-      <p:sp>
-        <p:nvSpPr>
-          <p:cNvPr id="6" name="Content Placeholder 5">
-            <a:extLst>
-              <a:ext uri="{FF2B5EF4-FFF2-40B4-BE49-F238E27FC236}">
-                <a16:creationId xmlns:a16="http://schemas.microsoft.com/office/drawing/2014/main" id="{D5B82FB3-62C6-547E-9BF2-23B7B586F204}"/>
-              </a:ext>
-            </a:extLst>
-          </p:cNvPr>
-          <p:cNvSpPr>
-            <a:spLocks noGrp="1"/>
-          </p:cNvSpPr>
-          <p:nvPr>
-            <p:ph sz="half" idx="15"/>
-          </p:nvPr>
-        </p:nvSpPr>
-        <p:spPr/>
-        <p:txBody>
-          <a:bodyPr>
-            <a:normAutofit fontScale="92500" lnSpcReduction="10000"/>
-          </a:bodyPr>
-          <a:lstStyle/>
-          <a:p>
-            <a:pPr marL="0" indent="0">
-              <a:buNone/>
-            </a:pPr>
-            <a:r>
-              <a:rPr lang="en-US" b="1" dirty="0"/>
-              <a:t>Software development</a:t>
-            </a:r>
-            <a:r>
-              <a:rPr lang="en-US" dirty="0"/>
-              <a:t>: Data team delivers packages like software teams for years</a:t>
-            </a:r>
-          </a:p>
-          <a:p>
-            <a:pPr marL="0" indent="0">
-              <a:buNone/>
-            </a:pPr>
-            <a:r>
-              <a:rPr lang="en-US" dirty="0"/>
-              <a:t>like need to create requirements,  documentations, explaining how it works, how to manage and troubleshoot with end-users in mind</a:t>
-            </a:r>
-          </a:p>
-        </p:txBody>
-      </p:sp>
-      <p:sp>
-        <p:nvSpPr>
-          <p:cNvPr id="4" name="Text Placeholder 3">
-            <a:extLst>
-              <a:ext uri="{FF2B5EF4-FFF2-40B4-BE49-F238E27FC236}">
-                <a16:creationId xmlns:a16="http://schemas.microsoft.com/office/drawing/2014/main" id="{AE6B76D1-DA93-E5FE-A0A2-AB3DBDF7A938}"/>
-              </a:ext>
-            </a:extLst>
-          </p:cNvPr>
-          <p:cNvSpPr>
-            <a:spLocks noGrp="1"/>
-          </p:cNvSpPr>
-          <p:nvPr>
-            <p:ph type="body" idx="10"/>
+              <a:t>What data we gathered, how they look like, and what is different in this data</a:t>
+            </a:r>
+          </a:p>
+          <a:p>
+            <a:r>
+              <a:rPr lang="en-US" dirty="0"/>
+              <a:t>How we organized them and why this way sample of code and output results </a:t>
+            </a:r>
+          </a:p>
+        </p:txBody>
+      </p:sp>
+      <p:sp>
+        <p:nvSpPr>
+          <p:cNvPr id="4" name="Slide Number Placeholder 3">
+            <a:extLst>
+              <a:ext uri="{FF2B5EF4-FFF2-40B4-BE49-F238E27FC236}">
+                <a16:creationId xmlns:a16="http://schemas.microsoft.com/office/drawing/2014/main" id="{F412CF62-3B03-D2FB-50C5-428783F730E1}"/>
+              </a:ext>
+            </a:extLst>
+          </p:cNvPr>
+          <p:cNvSpPr>
+            <a:spLocks noGrp="1"/>
+          </p:cNvSpPr>
+          <p:nvPr>
+            <p:ph type="sldNum" sz="quarter" idx="12"/>
           </p:nvPr>
         </p:nvSpPr>
         <p:spPr/>
@@ -7767,79 +7296,11 @@
           <a:bodyPr/>
           <a:lstStyle/>
           <a:p>
-            <a:r>
-              <a:rPr lang="en-US" dirty="0"/>
-              <a:t>How and Why</a:t>
-            </a:r>
-          </a:p>
-        </p:txBody>
-      </p:sp>
-      <p:sp>
-        <p:nvSpPr>
-          <p:cNvPr id="5" name="Content Placeholder 4">
-            <a:extLst>
-              <a:ext uri="{FF2B5EF4-FFF2-40B4-BE49-F238E27FC236}">
-                <a16:creationId xmlns:a16="http://schemas.microsoft.com/office/drawing/2014/main" id="{97545A84-99EE-17C7-C9BE-648829A8DB4C}"/>
-              </a:ext>
-            </a:extLst>
-          </p:cNvPr>
-          <p:cNvSpPr>
-            <a:spLocks noGrp="1"/>
-          </p:cNvSpPr>
-          <p:nvPr>
-            <p:ph sz="half" idx="14"/>
-          </p:nvPr>
-        </p:nvSpPr>
-        <p:spPr/>
-        <p:txBody>
-          <a:bodyPr/>
-          <a:lstStyle/>
-          <a:p>
-            <a:pPr marL="285750" indent="-285750">
-              <a:buFont typeface="Arial" panose="020B0604020202020204" pitchFamily="34" charset="0"/>
-              <a:buChar char="•"/>
-            </a:pPr>
-            <a:r>
-              <a:rPr lang="en-US" b="1" dirty="0"/>
-              <a:t>Data Team becomes like a software development team</a:t>
-            </a:r>
-            <a:endParaRPr lang="en-US" dirty="0"/>
-          </a:p>
-          <a:p>
-            <a:pPr marL="569214" lvl="1"/>
-            <a:r>
-              <a:rPr lang="en-US" sz="1600" b="0" i="0" dirty="0">
-                <a:effectLst/>
-                <a:latin typeface="SegoeUIVariable"/>
-              </a:rPr>
-              <a:t>Data teams (such as data engineers, data scientists, and analysts) operate similarly to software development teams.</a:t>
-            </a:r>
-          </a:p>
-          <a:p>
-            <a:pPr marL="569214" lvl="1"/>
-            <a:r>
-              <a:rPr lang="en-US" sz="1600" dirty="0">
-                <a:latin typeface="SegoeUIVariable"/>
-              </a:rPr>
-              <a:t>AI and Data need a holistic approach</a:t>
-            </a:r>
-            <a:endParaRPr lang="en-US" sz="1600" b="0" i="0" dirty="0">
-              <a:effectLst/>
-              <a:latin typeface="SegoeUIVariable"/>
-            </a:endParaRPr>
-          </a:p>
-          <a:p>
-            <a:pPr marL="569214" lvl="1"/>
-            <a:r>
-              <a:rPr lang="en-US" sz="1600" b="0" i="0" dirty="0">
-                <a:effectLst/>
-                <a:latin typeface="SegoeUIVariable"/>
-              </a:rPr>
-              <a:t>Learn AGILE to be easy to work in a collaborative environment.</a:t>
-            </a:r>
-          </a:p>
-          <a:p>
-            <a:pPr marL="569214" lvl="1"/>
+            <a:fld id="{A49DFD55-3C28-40EF-9E31-A92D2E4017FF}" type="slidenum">
+              <a:rPr lang="en-US" smtClean="0"/>
+              <a:pPr/>
+              <a:t>4</a:t>
+            </a:fld>
             <a:endParaRPr lang="en-US" dirty="0"/>
           </a:p>
         </p:txBody>
@@ -7847,7 +7308,7 @@
     </p:spTree>
     <p:extLst>
       <p:ext uri="{BB962C8B-B14F-4D97-AF65-F5344CB8AC3E}">
-        <p14:creationId xmlns:p14="http://schemas.microsoft.com/office/powerpoint/2010/main" val="294756942"/>
+        <p14:creationId xmlns:p14="http://schemas.microsoft.com/office/powerpoint/2010/main" val="3624765615"/>
       </p:ext>
     </p:extLst>
   </p:cSld>
@@ -7876,10 +7337,10 @@
       </p:grpSpPr>
       <p:sp>
         <p:nvSpPr>
-          <p:cNvPr id="2" name="Title 1">
-            <a:extLst>
-              <a:ext uri="{FF2B5EF4-FFF2-40B4-BE49-F238E27FC236}">
-                <a16:creationId xmlns:a16="http://schemas.microsoft.com/office/drawing/2014/main" id="{9528DBD1-DB29-D44F-FD5A-3071BB37EF37}"/>
+          <p:cNvPr id="5" name="Title 4">
+            <a:extLst>
+              <a:ext uri="{FF2B5EF4-FFF2-40B4-BE49-F238E27FC236}">
+                <a16:creationId xmlns:a16="http://schemas.microsoft.com/office/drawing/2014/main" id="{14768BED-BB58-474B-18D1-E03C6692B304}"/>
               </a:ext>
             </a:extLst>
           </p:cNvPr>
@@ -7897,25 +7358,25 @@
           <a:p>
             <a:r>
               <a:rPr lang="en-US" dirty="0"/>
-              <a:t>RAG will be all</a:t>
-            </a:r>
-          </a:p>
-        </p:txBody>
-      </p:sp>
-      <p:sp>
-        <p:nvSpPr>
-          <p:cNvPr id="3" name="Text Placeholder 2">
-            <a:extLst>
-              <a:ext uri="{FF2B5EF4-FFF2-40B4-BE49-F238E27FC236}">
-                <a16:creationId xmlns:a16="http://schemas.microsoft.com/office/drawing/2014/main" id="{726B12F0-0992-FDEA-E538-7182599D43D0}"/>
-              </a:ext>
-            </a:extLst>
-          </p:cNvPr>
-          <p:cNvSpPr>
-            <a:spLocks noGrp="1"/>
-          </p:cNvSpPr>
-          <p:nvPr>
-            <p:ph type="body" idx="1"/>
+              <a:t>How: How we gather the data</a:t>
+            </a:r>
+          </a:p>
+        </p:txBody>
+      </p:sp>
+      <p:sp>
+        <p:nvSpPr>
+          <p:cNvPr id="6" name="Table Placeholder 5">
+            <a:extLst>
+              <a:ext uri="{FF2B5EF4-FFF2-40B4-BE49-F238E27FC236}">
+                <a16:creationId xmlns:a16="http://schemas.microsoft.com/office/drawing/2014/main" id="{9492D01A-B138-6853-53B7-0B23887E5406}"/>
+              </a:ext>
+            </a:extLst>
+          </p:cNvPr>
+          <p:cNvSpPr>
+            <a:spLocks noGrp="1"/>
+          </p:cNvSpPr>
+          <p:nvPr>
+            <p:ph type="tbl" sz="quarter" idx="14"/>
           </p:nvPr>
         </p:nvSpPr>
         <p:spPr/>
@@ -7925,96 +7386,25 @@
           <a:p>
             <a:r>
               <a:rPr lang="en-US" dirty="0"/>
-              <a:t>What</a:t>
-            </a:r>
-          </a:p>
-        </p:txBody>
-      </p:sp>
-      <p:sp>
-        <p:nvSpPr>
-          <p:cNvPr id="6" name="Content Placeholder 5">
-            <a:extLst>
-              <a:ext uri="{FF2B5EF4-FFF2-40B4-BE49-F238E27FC236}">
-                <a16:creationId xmlns:a16="http://schemas.microsoft.com/office/drawing/2014/main" id="{D5B82FB3-62C6-547E-9BF2-23B7B586F204}"/>
-              </a:ext>
-            </a:extLst>
-          </p:cNvPr>
-          <p:cNvSpPr>
-            <a:spLocks noGrp="1"/>
-          </p:cNvSpPr>
-          <p:nvPr>
-            <p:ph sz="half" idx="15"/>
-          </p:nvPr>
-        </p:nvSpPr>
-        <p:spPr/>
-        <p:txBody>
-          <a:bodyPr>
-            <a:normAutofit fontScale="92500" lnSpcReduction="10000"/>
-          </a:bodyPr>
-          <a:lstStyle/>
-          <a:p>
-            <a:pPr marL="0" indent="0">
-              <a:buNone/>
-            </a:pPr>
-            <a:r>
-              <a:rPr lang="en-US" b="1" dirty="0"/>
-              <a:t>RAG: </a:t>
-            </a:r>
-            <a:r>
-              <a:rPr lang="en-US" dirty="0"/>
-              <a:t>Retrieval Augmented Generation</a:t>
-            </a:r>
-          </a:p>
-          <a:p>
-            <a:pPr marL="0" indent="0">
-              <a:buNone/>
-            </a:pPr>
-            <a:r>
-              <a:rPr lang="en-US" dirty="0"/>
-              <a:t>It combines critical components </a:t>
-            </a:r>
-            <a:r>
-              <a:rPr lang="en-US" b="1" dirty="0"/>
-              <a:t>retrieval</a:t>
-            </a:r>
-            <a:r>
-              <a:rPr lang="en-US" dirty="0"/>
-              <a:t> (finding relevant information) and </a:t>
-            </a:r>
-            <a:r>
-              <a:rPr lang="en-US" b="1" dirty="0"/>
-              <a:t>generation</a:t>
-            </a:r>
-            <a:r>
-              <a:rPr lang="en-US" dirty="0"/>
-              <a:t> (creating new content)</a:t>
-            </a:r>
-          </a:p>
-          <a:p>
-            <a:pPr marL="0" indent="0">
-              <a:buNone/>
-            </a:pPr>
-            <a:r>
-              <a:rPr lang="en-US" dirty="0"/>
-              <a:t>Retrieval mechanism to improve the GenAI quality</a:t>
-            </a:r>
-          </a:p>
-        </p:txBody>
-      </p:sp>
-      <p:sp>
-        <p:nvSpPr>
-          <p:cNvPr id="4" name="Text Placeholder 3">
-            <a:extLst>
-              <a:ext uri="{FF2B5EF4-FFF2-40B4-BE49-F238E27FC236}">
-                <a16:creationId xmlns:a16="http://schemas.microsoft.com/office/drawing/2014/main" id="{AE6B76D1-DA93-E5FE-A0A2-AB3DBDF7A938}"/>
-              </a:ext>
-            </a:extLst>
-          </p:cNvPr>
-          <p:cNvSpPr>
-            <a:spLocks noGrp="1"/>
-          </p:cNvSpPr>
-          <p:nvPr>
-            <p:ph type="body" idx="10"/>
+              <a:t>What part of the data was complex, and how we tackle the complexity to achieve our goal, how we achieve our goal </a:t>
+            </a:r>
+          </a:p>
+        </p:txBody>
+      </p:sp>
+      <p:sp>
+        <p:nvSpPr>
+          <p:cNvPr id="4" name="Slide Number Placeholder 3">
+            <a:extLst>
+              <a:ext uri="{FF2B5EF4-FFF2-40B4-BE49-F238E27FC236}">
+                <a16:creationId xmlns:a16="http://schemas.microsoft.com/office/drawing/2014/main" id="{F412CF62-3B03-D2FB-50C5-428783F730E1}"/>
+              </a:ext>
+            </a:extLst>
+          </p:cNvPr>
+          <p:cNvSpPr>
+            <a:spLocks noGrp="1"/>
+          </p:cNvSpPr>
+          <p:nvPr>
+            <p:ph type="sldNum" sz="quarter" idx="12"/>
           </p:nvPr>
         </p:nvSpPr>
         <p:spPr/>
@@ -8022,77 +7412,11 @@
           <a:bodyPr/>
           <a:lstStyle/>
           <a:p>
-            <a:r>
-              <a:rPr lang="en-US" dirty="0"/>
-              <a:t>How and Why</a:t>
-            </a:r>
-          </a:p>
-        </p:txBody>
-      </p:sp>
-      <p:sp>
-        <p:nvSpPr>
-          <p:cNvPr id="5" name="Content Placeholder 4">
-            <a:extLst>
-              <a:ext uri="{FF2B5EF4-FFF2-40B4-BE49-F238E27FC236}">
-                <a16:creationId xmlns:a16="http://schemas.microsoft.com/office/drawing/2014/main" id="{97545A84-99EE-17C7-C9BE-648829A8DB4C}"/>
-              </a:ext>
-            </a:extLst>
-          </p:cNvPr>
-          <p:cNvSpPr>
-            <a:spLocks noGrp="1"/>
-          </p:cNvSpPr>
-          <p:nvPr>
-            <p:ph sz="half" idx="14"/>
-          </p:nvPr>
-        </p:nvSpPr>
-        <p:spPr/>
-        <p:txBody>
-          <a:bodyPr>
-            <a:normAutofit/>
-          </a:bodyPr>
-          <a:lstStyle/>
-          <a:p>
-            <a:pPr marL="285750" indent="-285750">
-              <a:buFont typeface="Arial" panose="020B0604020202020204" pitchFamily="34" charset="0"/>
-              <a:buChar char="•"/>
-            </a:pPr>
-            <a:r>
-              <a:rPr lang="en-US" b="1" dirty="0"/>
-              <a:t>Improve GenAI by contextual generation, Reducing Hallucinations, and Practical applications </a:t>
-            </a:r>
-            <a:endParaRPr lang="en-US" dirty="0"/>
-          </a:p>
-          <a:p>
-            <a:pPr marL="569214" lvl="1"/>
-            <a:r>
-              <a:rPr lang="en-US" sz="1600" dirty="0">
-                <a:latin typeface="SegoeUIVariable"/>
-              </a:rPr>
-              <a:t>To deliver relevant content, deliver real-world applications, generate accurate information, and leverage existing knowledge.</a:t>
-            </a:r>
-            <a:endParaRPr lang="en-US" sz="1600" b="0" i="0" dirty="0">
-              <a:effectLst/>
-              <a:latin typeface="SegoeUIVariable"/>
-            </a:endParaRPr>
-          </a:p>
-          <a:p>
-            <a:pPr marL="569214" lvl="1"/>
-            <a:r>
-              <a:rPr lang="en-US" sz="1600" dirty="0">
-                <a:latin typeface="SegoeUIVariable"/>
-              </a:rPr>
-              <a:t>It retrieves relevant information, generates content using the retrieved information, and fine-tunes for correctness, non-bias, and quality</a:t>
-            </a:r>
-            <a:r>
-              <a:rPr lang="en-US" sz="1600" b="0" i="0" dirty="0">
-                <a:effectLst/>
-                <a:latin typeface="SegoeUIVariable"/>
-              </a:rPr>
-              <a:t>.</a:t>
-            </a:r>
-          </a:p>
-          <a:p>
-            <a:pPr marL="569214" lvl="1"/>
+            <a:fld id="{A49DFD55-3C28-40EF-9E31-A92D2E4017FF}" type="slidenum">
+              <a:rPr lang="en-US" smtClean="0"/>
+              <a:pPr/>
+              <a:t>5</a:t>
+            </a:fld>
             <a:endParaRPr lang="en-US" dirty="0"/>
           </a:p>
         </p:txBody>
@@ -8100,7 +7424,7 @@
     </p:spTree>
     <p:extLst>
       <p:ext uri="{BB962C8B-B14F-4D97-AF65-F5344CB8AC3E}">
-        <p14:creationId xmlns:p14="http://schemas.microsoft.com/office/powerpoint/2010/main" val="706140070"/>
+        <p14:creationId xmlns:p14="http://schemas.microsoft.com/office/powerpoint/2010/main" val="3990571204"/>
       </p:ext>
     </p:extLst>
   </p:cSld>
@@ -8129,10 +7453,10 @@
       </p:grpSpPr>
       <p:sp>
         <p:nvSpPr>
-          <p:cNvPr id="2" name="Title 1">
-            <a:extLst>
-              <a:ext uri="{FF2B5EF4-FFF2-40B4-BE49-F238E27FC236}">
-                <a16:creationId xmlns:a16="http://schemas.microsoft.com/office/drawing/2014/main" id="{F230FDC2-5A50-7007-8941-889203149CCB}"/>
+          <p:cNvPr id="5" name="Title 4">
+            <a:extLst>
+              <a:ext uri="{FF2B5EF4-FFF2-40B4-BE49-F238E27FC236}">
+                <a16:creationId xmlns:a16="http://schemas.microsoft.com/office/drawing/2014/main" id="{14768BED-BB58-474B-18D1-E03C6692B304}"/>
               </a:ext>
             </a:extLst>
           </p:cNvPr>
@@ -8150,29 +7474,25 @@
           <a:p>
             <a:r>
               <a:rPr lang="en-US" dirty="0"/>
-              <a:t>Big data will get small, data downsizing</a:t>
-            </a:r>
-            <a:br>
-              <a:rPr lang="en-US" dirty="0"/>
-            </a:br>
-            <a:endParaRPr lang="en-US" dirty="0"/>
-          </a:p>
-        </p:txBody>
-      </p:sp>
-      <p:sp>
-        <p:nvSpPr>
-          <p:cNvPr id="3" name="Text Placeholder 2">
-            <a:extLst>
-              <a:ext uri="{FF2B5EF4-FFF2-40B4-BE49-F238E27FC236}">
-                <a16:creationId xmlns:a16="http://schemas.microsoft.com/office/drawing/2014/main" id="{A2932B37-9B1E-0D72-5960-D17CFCF0143E}"/>
-              </a:ext>
-            </a:extLst>
-          </p:cNvPr>
-          <p:cNvSpPr>
-            <a:spLocks noGrp="1"/>
-          </p:cNvSpPr>
-          <p:nvPr>
-            <p:ph type="body" idx="1"/>
+              <a:t>Results: What results say</a:t>
+            </a:r>
+          </a:p>
+        </p:txBody>
+      </p:sp>
+      <p:sp>
+        <p:nvSpPr>
+          <p:cNvPr id="6" name="Table Placeholder 5">
+            <a:extLst>
+              <a:ext uri="{FF2B5EF4-FFF2-40B4-BE49-F238E27FC236}">
+                <a16:creationId xmlns:a16="http://schemas.microsoft.com/office/drawing/2014/main" id="{9492D01A-B138-6853-53B7-0B23887E5406}"/>
+              </a:ext>
+            </a:extLst>
+          </p:cNvPr>
+          <p:cNvSpPr>
+            <a:spLocks noGrp="1"/>
+          </p:cNvSpPr>
+          <p:nvPr>
+            <p:ph type="tbl" sz="quarter" idx="14"/>
           </p:nvPr>
         </p:nvSpPr>
         <p:spPr/>
@@ -8182,86 +7502,25 @@
           <a:p>
             <a:r>
               <a:rPr lang="en-US" dirty="0"/>
-              <a:t>What</a:t>
-            </a:r>
-          </a:p>
-        </p:txBody>
-      </p:sp>
-      <p:sp>
-        <p:nvSpPr>
-          <p:cNvPr id="4" name="Content Placeholder 3">
-            <a:extLst>
-              <a:ext uri="{FF2B5EF4-FFF2-40B4-BE49-F238E27FC236}">
-                <a16:creationId xmlns:a16="http://schemas.microsoft.com/office/drawing/2014/main" id="{65B1AAF9-A85A-94AD-0F42-3E296252615E}"/>
-              </a:ext>
-            </a:extLst>
-          </p:cNvPr>
-          <p:cNvSpPr>
-            <a:spLocks noGrp="1"/>
-          </p:cNvSpPr>
-          <p:nvPr>
-            <p:ph sz="half" idx="15"/>
-          </p:nvPr>
-        </p:nvSpPr>
-        <p:spPr/>
-        <p:txBody>
-          <a:bodyPr>
-            <a:normAutofit/>
-          </a:bodyPr>
-          <a:lstStyle/>
-          <a:p>
-            <a:pPr marL="0" indent="0">
-              <a:buNone/>
-            </a:pPr>
-            <a:r>
-              <a:rPr lang="en-US" dirty="0"/>
-              <a:t>Big Data gets Small: emphasizes efficiency, relevance, and practicality in handling data, ultimately benefiting organizations in their AI and analytics endeavors</a:t>
-            </a:r>
-          </a:p>
-        </p:txBody>
-      </p:sp>
-      <p:sp>
-        <p:nvSpPr>
-          <p:cNvPr id="5" name="Text Placeholder 4">
-            <a:extLst>
-              <a:ext uri="{FF2B5EF4-FFF2-40B4-BE49-F238E27FC236}">
-                <a16:creationId xmlns:a16="http://schemas.microsoft.com/office/drawing/2014/main" id="{1C634A68-0D75-8622-F2C1-9508F1404A34}"/>
-              </a:ext>
-            </a:extLst>
-          </p:cNvPr>
-          <p:cNvSpPr>
-            <a:spLocks noGrp="1"/>
-          </p:cNvSpPr>
-          <p:nvPr>
-            <p:ph type="body" idx="10"/>
-          </p:nvPr>
-        </p:nvSpPr>
-        <p:spPr/>
-        <p:txBody>
-          <a:bodyPr/>
-          <a:lstStyle/>
-          <a:p>
-            <a:r>
-              <a:rPr lang="en-US" dirty="0"/>
-              <a:t>How and Why</a:t>
-            </a:r>
-          </a:p>
-        </p:txBody>
-      </p:sp>
-      <p:sp>
-        <p:nvSpPr>
-          <p:cNvPr id="7" name="Slide Number Placeholder 6">
-            <a:extLst>
-              <a:ext uri="{FF2B5EF4-FFF2-40B4-BE49-F238E27FC236}">
-                <a16:creationId xmlns:a16="http://schemas.microsoft.com/office/drawing/2014/main" id="{FCFF2E18-2653-E0FB-2C28-F0331DFC4B1A}"/>
-              </a:ext>
-            </a:extLst>
-          </p:cNvPr>
-          <p:cNvSpPr>
-            <a:spLocks noGrp="1"/>
-          </p:cNvSpPr>
-          <p:nvPr>
-            <p:ph type="sldNum" sz="quarter" idx="13"/>
+              <a:t>What we want to represent here and why to answer: What results we have chosen, what they say about the hypothesis, what our analyses on super Tuesday may say about the election, and what we present here </a:t>
+            </a:r>
+          </a:p>
+        </p:txBody>
+      </p:sp>
+      <p:sp>
+        <p:nvSpPr>
+          <p:cNvPr id="4" name="Slide Number Placeholder 3">
+            <a:extLst>
+              <a:ext uri="{FF2B5EF4-FFF2-40B4-BE49-F238E27FC236}">
+                <a16:creationId xmlns:a16="http://schemas.microsoft.com/office/drawing/2014/main" id="{F412CF62-3B03-D2FB-50C5-428783F730E1}"/>
+              </a:ext>
+            </a:extLst>
+          </p:cNvPr>
+          <p:cNvSpPr>
+            <a:spLocks noGrp="1"/>
+          </p:cNvSpPr>
+          <p:nvPr>
+            <p:ph type="sldNum" sz="quarter" idx="12"/>
           </p:nvPr>
         </p:nvSpPr>
         <p:spPr/>
@@ -8278,83 +7537,10 @@
           </a:p>
         </p:txBody>
       </p:sp>
-      <p:sp>
-        <p:nvSpPr>
-          <p:cNvPr id="8" name="Content Placeholder 4">
-            <a:extLst>
-              <a:ext uri="{FF2B5EF4-FFF2-40B4-BE49-F238E27FC236}">
-                <a16:creationId xmlns:a16="http://schemas.microsoft.com/office/drawing/2014/main" id="{0434B976-3483-F4C6-50FE-ACBE2E236F01}"/>
-              </a:ext>
-            </a:extLst>
-          </p:cNvPr>
-          <p:cNvSpPr>
-            <a:spLocks noGrp="1"/>
-          </p:cNvSpPr>
-          <p:nvPr>
-            <p:ph sz="half" idx="14"/>
-          </p:nvPr>
-        </p:nvSpPr>
-        <p:spPr>
-          <a:xfrm>
-            <a:off x="4754881" y="3324859"/>
-            <a:ext cx="5506720" cy="3031489"/>
-          </a:xfrm>
-        </p:spPr>
-        <p:txBody>
-          <a:bodyPr>
-            <a:normAutofit/>
-          </a:bodyPr>
-          <a:lstStyle/>
-          <a:p>
-            <a:pPr marL="285750" indent="-285750">
-              <a:buFont typeface="Arial" panose="020B0604020202020204" pitchFamily="34" charset="0"/>
-              <a:buChar char="•"/>
-            </a:pPr>
-            <a:r>
-              <a:rPr lang="en-US" b="1" dirty="0"/>
-              <a:t>Shift in data handling and management </a:t>
-            </a:r>
-            <a:endParaRPr lang="en-US" dirty="0"/>
-          </a:p>
-          <a:p>
-            <a:pPr marL="569214" lvl="1"/>
-            <a:r>
-              <a:rPr lang="en-US" sz="1600" dirty="0">
-                <a:latin typeface="SegoeUIVariable"/>
-              </a:rPr>
-              <a:t>Prevent data overload, simplify the data complexity, and make big data manageable.</a:t>
-            </a:r>
-          </a:p>
-          <a:p>
-            <a:pPr marL="569214" lvl="1"/>
-            <a:r>
-              <a:rPr lang="en-US" sz="1600" b="0" i="0" dirty="0">
-                <a:effectLst/>
-                <a:latin typeface="SegoeUIVariable"/>
-              </a:rPr>
-              <a:t>Organizations start pruning unnecessary data, compressing data, extracting meaningful insights, summarizing, and data dimension reduction.</a:t>
-            </a:r>
-          </a:p>
-          <a:p>
-            <a:pPr marL="569214" lvl="1"/>
-            <a:r>
-              <a:rPr lang="en-US" sz="1600" b="0" i="0" dirty="0">
-                <a:effectLst/>
-                <a:latin typeface="SegoeUIVariable"/>
-              </a:rPr>
-              <a:t>Improve processing time for personal computers, save cost in data storage, dimension reduction also helps with security (up-for-debate) </a:t>
-            </a:r>
-          </a:p>
-          <a:p>
-            <a:pPr marL="569214" lvl="1"/>
-            <a:endParaRPr lang="en-US" dirty="0"/>
-          </a:p>
-        </p:txBody>
-      </p:sp>
     </p:spTree>
     <p:extLst>
       <p:ext uri="{BB962C8B-B14F-4D97-AF65-F5344CB8AC3E}">
-        <p14:creationId xmlns:p14="http://schemas.microsoft.com/office/powerpoint/2010/main" val="3740506071"/>
+        <p14:creationId xmlns:p14="http://schemas.microsoft.com/office/powerpoint/2010/main" val="658371510"/>
       </p:ext>
     </p:extLst>
   </p:cSld>
@@ -8383,18 +7569,18 @@
       </p:grpSpPr>
       <p:sp>
         <p:nvSpPr>
-          <p:cNvPr id="3" name="Text Placeholder 2">
-            <a:extLst>
-              <a:ext uri="{FF2B5EF4-FFF2-40B4-BE49-F238E27FC236}">
-                <a16:creationId xmlns:a16="http://schemas.microsoft.com/office/drawing/2014/main" id="{9A878647-2864-3478-C8D9-7D3779F3D66B}"/>
-              </a:ext>
-            </a:extLst>
-          </p:cNvPr>
-          <p:cNvSpPr>
-            <a:spLocks noGrp="1"/>
-          </p:cNvSpPr>
-          <p:nvPr>
-            <p:ph type="body" idx="1"/>
+          <p:cNvPr id="5" name="Title 4">
+            <a:extLst>
+              <a:ext uri="{FF2B5EF4-FFF2-40B4-BE49-F238E27FC236}">
+                <a16:creationId xmlns:a16="http://schemas.microsoft.com/office/drawing/2014/main" id="{14768BED-BB58-474B-18D1-E03C6692B304}"/>
+              </a:ext>
+            </a:extLst>
+          </p:cNvPr>
+          <p:cNvSpPr>
+            <a:spLocks noGrp="1"/>
+          </p:cNvSpPr>
+          <p:nvPr>
+            <p:ph type="title"/>
           </p:nvPr>
         </p:nvSpPr>
         <p:spPr/>
@@ -8402,24 +7588,27 @@
           <a:bodyPr/>
           <a:lstStyle/>
           <a:p>
-            <a:endParaRPr lang="en-US" dirty="0"/>
-          </a:p>
-        </p:txBody>
-      </p:sp>
-      <p:sp>
-        <p:nvSpPr>
-          <p:cNvPr id="4" name="Content Placeholder 3">
-            <a:extLst>
-              <a:ext uri="{FF2B5EF4-FFF2-40B4-BE49-F238E27FC236}">
-                <a16:creationId xmlns:a16="http://schemas.microsoft.com/office/drawing/2014/main" id="{D32D2EE2-84E4-87F6-4CF2-5D13B5832517}"/>
-              </a:ext>
-            </a:extLst>
-          </p:cNvPr>
-          <p:cNvSpPr>
-            <a:spLocks noGrp="1"/>
-          </p:cNvSpPr>
-          <p:nvPr>
-            <p:ph sz="half" idx="15"/>
+            <a:r>
+              <a:rPr lang="en-US" dirty="0"/>
+              <a:t>Lesson learned</a:t>
+            </a:r>
+          </a:p>
+        </p:txBody>
+      </p:sp>
+      <p:sp>
+        <p:nvSpPr>
+          <p:cNvPr id="6" name="Table Placeholder 5">
+            <a:extLst>
+              <a:ext uri="{FF2B5EF4-FFF2-40B4-BE49-F238E27FC236}">
+                <a16:creationId xmlns:a16="http://schemas.microsoft.com/office/drawing/2014/main" id="{9492D01A-B138-6853-53B7-0B23887E5406}"/>
+              </a:ext>
+            </a:extLst>
+          </p:cNvPr>
+          <p:cNvSpPr>
+            <a:spLocks noGrp="1"/>
+          </p:cNvSpPr>
+          <p:nvPr>
+            <p:ph type="tbl" sz="quarter" idx="14"/>
           </p:nvPr>
         </p:nvSpPr>
         <p:spPr/>
@@ -8427,74 +7616,27 @@
           <a:bodyPr/>
           <a:lstStyle/>
           <a:p>
-            <a:endParaRPr lang="en-US" dirty="0"/>
-          </a:p>
-        </p:txBody>
-      </p:sp>
-      <p:sp>
-        <p:nvSpPr>
-          <p:cNvPr id="5" name="Text Placeholder 4">
-            <a:extLst>
-              <a:ext uri="{FF2B5EF4-FFF2-40B4-BE49-F238E27FC236}">
-                <a16:creationId xmlns:a16="http://schemas.microsoft.com/office/drawing/2014/main" id="{15877C50-5FD0-B6E9-64A0-2AD737D76ADB}"/>
-              </a:ext>
-            </a:extLst>
-          </p:cNvPr>
-          <p:cNvSpPr>
-            <a:spLocks noGrp="1"/>
-          </p:cNvSpPr>
-          <p:nvPr>
-            <p:ph type="body" idx="10"/>
-          </p:nvPr>
-        </p:nvSpPr>
-        <p:spPr/>
-        <p:txBody>
-          <a:bodyPr/>
-          <a:lstStyle/>
-          <a:p>
-            <a:endParaRPr lang="en-US" dirty="0"/>
-          </a:p>
-        </p:txBody>
-      </p:sp>
-      <p:sp>
-        <p:nvSpPr>
-          <p:cNvPr id="6" name="Content Placeholder 5">
-            <a:extLst>
-              <a:ext uri="{FF2B5EF4-FFF2-40B4-BE49-F238E27FC236}">
-                <a16:creationId xmlns:a16="http://schemas.microsoft.com/office/drawing/2014/main" id="{8B77C787-565F-79FE-97DD-A90DBC55E0FC}"/>
-              </a:ext>
-            </a:extLst>
-          </p:cNvPr>
-          <p:cNvSpPr>
-            <a:spLocks noGrp="1"/>
-          </p:cNvSpPr>
-          <p:nvPr>
-            <p:ph sz="half" idx="14"/>
-          </p:nvPr>
-        </p:nvSpPr>
-        <p:spPr/>
-        <p:txBody>
-          <a:bodyPr/>
-          <a:lstStyle/>
-          <a:p>
-            <a:endParaRPr lang="en-US" dirty="0"/>
-          </a:p>
-        </p:txBody>
-      </p:sp>
-      <p:sp>
-        <p:nvSpPr>
-          <p:cNvPr id="7" name="Slide Number Placeholder 6">
-            <a:extLst>
-              <a:ext uri="{FF2B5EF4-FFF2-40B4-BE49-F238E27FC236}">
-                <a16:creationId xmlns:a16="http://schemas.microsoft.com/office/drawing/2014/main" id="{00AF405F-7659-D572-D3B9-58A001E25CF3}"/>
-              </a:ext>
-            </a:extLst>
-          </p:cNvPr>
-          <p:cNvSpPr>
-            <a:spLocks noGrp="1"/>
-          </p:cNvSpPr>
-          <p:nvPr>
-            <p:ph type="sldNum" sz="quarter" idx="13"/>
+            <a:r>
+              <a:rPr lang="en-US" dirty="0"/>
+              <a:t>What is our take from he project, what would we do differently, what we did well, and what we have learned </a:t>
+            </a:r>
+          </a:p>
+        </p:txBody>
+      </p:sp>
+      <p:sp>
+        <p:nvSpPr>
+          <p:cNvPr id="4" name="Slide Number Placeholder 3">
+            <a:extLst>
+              <a:ext uri="{FF2B5EF4-FFF2-40B4-BE49-F238E27FC236}">
+                <a16:creationId xmlns:a16="http://schemas.microsoft.com/office/drawing/2014/main" id="{F412CF62-3B03-D2FB-50C5-428783F730E1}"/>
+              </a:ext>
+            </a:extLst>
+          </p:cNvPr>
+          <p:cNvSpPr>
+            <a:spLocks noGrp="1"/>
+          </p:cNvSpPr>
+          <p:nvPr>
+            <p:ph type="sldNum" sz="quarter" idx="12"/>
           </p:nvPr>
         </p:nvSpPr>
         <p:spPr/>
@@ -8511,70 +7653,10 @@
           </a:p>
         </p:txBody>
       </p:sp>
-      <p:sp>
-        <p:nvSpPr>
-          <p:cNvPr id="8" name="Title 7">
-            <a:extLst>
-              <a:ext uri="{FF2B5EF4-FFF2-40B4-BE49-F238E27FC236}">
-                <a16:creationId xmlns:a16="http://schemas.microsoft.com/office/drawing/2014/main" id="{A148F26A-3040-E8A6-D603-E4441E54C4C4}"/>
-              </a:ext>
-            </a:extLst>
-          </p:cNvPr>
-          <p:cNvSpPr txBox="1">
-            <a:spLocks noGrp="1"/>
-          </p:cNvSpPr>
-          <p:nvPr>
-            <p:ph type="title"/>
-          </p:nvPr>
-        </p:nvSpPr>
-        <p:spPr>
-          <a:xfrm>
-            <a:off x="1341438" y="1250446"/>
-            <a:ext cx="9953625" cy="1089529"/>
-          </a:xfrm>
-          <a:prstGeom prst="rect">
-            <a:avLst/>
-          </a:prstGeom>
-          <a:noFill/>
-        </p:spPr>
-        <p:txBody>
-          <a:bodyPr wrap="square">
-            <a:spAutoFit/>
-          </a:bodyPr>
-          <a:lstStyle/>
-          <a:p>
-            <a:r>
-              <a:rPr lang="en-US" sz="3600" b="1" i="0" dirty="0">
-                <a:solidFill>
-                  <a:srgbClr val="242424"/>
-                </a:solidFill>
-                <a:effectLst>
-                  <a:outerShdw blurRad="38100" dist="38100" dir="2700000" algn="tl">
-                    <a:srgbClr val="000000">
-                      <a:alpha val="43137"/>
-                    </a:srgbClr>
-                  </a:outerShdw>
-                </a:effectLst>
-                <a:latin typeface="source-serif-pro"/>
-              </a:rPr>
-              <a:t>If 2023 was the year of AI, 2024 will be the year of operationalizing AI</a:t>
-            </a:r>
-            <a:endParaRPr lang="en-US" sz="3600" b="1" dirty="0">
-              <a:effectLst>
-                <a:outerShdw blurRad="38100" dist="38100" dir="2700000" algn="tl">
-                  <a:srgbClr val="000000">
-                    <a:alpha val="43137"/>
-                  </a:srgbClr>
-                </a:outerShdw>
-              </a:effectLst>
-            </a:endParaRPr>
-          </a:p>
-        </p:txBody>
-      </p:sp>
     </p:spTree>
     <p:extLst>
       <p:ext uri="{BB962C8B-B14F-4D97-AF65-F5344CB8AC3E}">
-        <p14:creationId xmlns:p14="http://schemas.microsoft.com/office/powerpoint/2010/main" val="3505422092"/>
+        <p14:creationId xmlns:p14="http://schemas.microsoft.com/office/powerpoint/2010/main" val="512120919"/>
       </p:ext>
     </p:extLst>
   </p:cSld>
@@ -8782,19 +7864,18 @@
           <a:lstStyle/>
           <a:p>
             <a:r>
-              <a:rPr lang="en-US" dirty="0"/>
-              <a:t>K00hPy &lt;- </a:t>
-            </a:r>
-            <a:r>
-              <a:rPr lang="en-US" dirty="0" err="1"/>
-              <a:t>Koohyar_Pooladvand</a:t>
-            </a:r>
-            <a:endParaRPr lang="en-US" dirty="0"/>
-          </a:p>
-          <a:p>
-            <a:r>
-              <a:rPr lang="en-US" dirty="0"/>
-              <a:t>Koohyar.pooladvand69@spsmail.cuny.edu</a:t>
+              <a:rPr lang="en-US" b="1" dirty="0"/>
+              <a:t>Team:</a:t>
+            </a:r>
+          </a:p>
+          <a:p>
+            <a:r>
+              <a:rPr lang="en-US" sz="1800" dirty="0"/>
+              <a:t>Anthony C. , James N, Koohyar P., and victor T.</a:t>
+            </a:r>
+            <a:r>
+              <a:rPr lang="en-US" dirty="0"/>
+              <a:t> </a:t>
             </a:r>
           </a:p>
           <a:p>

</xml_diff>